<commit_message>
added sections for context-helper and ast
</commit_message>
<xml_diff>
--- a/Presentation/RMpresentation_rUTRC.pptx
+++ b/Presentation/RMpresentation_rUTRC.pptx
@@ -139,7 +139,7 @@
   </p:defaultTextStyle>
   <p:extLst>
     <p:ext uri="{EFAFB233-063F-42B5-8137-9DF3F51BA10A}">
-      <p15:sldGuideLst xmlns:p15="http://schemas.microsoft.com/office/powerpoint/2012/main" xmlns="">
+      <p15:sldGuideLst xmlns="" xmlns:p15="http://schemas.microsoft.com/office/powerpoint/2012/main">
         <p15:guide id="1" orient="horz" pos="3922">
           <p15:clr>
             <a:srgbClr val="A4A3A4"/>
@@ -292,7 +292,7 @@
             <a:fld id="{A69EF808-F88A-4519-8B4A-304F69ADB1D5}" type="datetimeFigureOut">
               <a:rPr lang="en-US" smtClean="0"/>
               <a:pPr/>
-              <a:t>7/5/2017</a:t>
+              <a:t>7/7/2017</a:t>
             </a:fld>
             <a:endParaRPr lang="en-US" dirty="0"/>
           </a:p>
@@ -460,7 +460,7 @@
             <a:fld id="{339ABB9F-C801-40D8-A8FD-7A154702A1CA}" type="datetimeFigureOut">
               <a:rPr lang="en-US" smtClean="0"/>
               <a:pPr/>
-              <a:t>7/5/2017</a:t>
+              <a:t>7/7/2017</a:t>
             </a:fld>
             <a:endParaRPr lang="en-US" dirty="0"/>
           </a:p>
@@ -808,6 +808,698 @@
     <p:extLst>
       <p:ext uri="{BB962C8B-B14F-4D97-AF65-F5344CB8AC3E}">
         <p14:creationId xmlns:p14="http://schemas.microsoft.com/office/powerpoint/2010/main" val="1026451299"/>
+      </p:ext>
+    </p:extLst>
+  </p:cSld>
+  <p:clrMapOvr>
+    <a:masterClrMapping/>
+  </p:clrMapOvr>
+</p:notes>
+</file>
+
+<file path=ppt/notesSlides/notesSlide2.xml><?xml version="1.0" encoding="utf-8"?>
+<p:notes xmlns:a="http://schemas.openxmlformats.org/drawingml/2006/main" xmlns:r="http://schemas.openxmlformats.org/officeDocument/2006/relationships" xmlns:p="http://schemas.openxmlformats.org/presentationml/2006/main">
+  <p:cSld>
+    <p:spTree>
+      <p:nvGrpSpPr>
+        <p:cNvPr id="1" name=""/>
+        <p:cNvGrpSpPr/>
+        <p:nvPr/>
+      </p:nvGrpSpPr>
+      <p:grpSpPr>
+        <a:xfrm>
+          <a:off x="0" y="0"/>
+          <a:ext cx="0" cy="0"/>
+          <a:chOff x="0" y="0"/>
+          <a:chExt cx="0" cy="0"/>
+        </a:xfrm>
+      </p:grpSpPr>
+      <p:sp>
+        <p:nvSpPr>
+          <p:cNvPr id="2" name="Slide Image Placeholder 1"/>
+          <p:cNvSpPr>
+            <a:spLocks noGrp="1" noRot="1" noChangeAspect="1"/>
+          </p:cNvSpPr>
+          <p:nvPr>
+            <p:ph type="sldImg"/>
+          </p:nvPr>
+        </p:nvSpPr>
+        <p:spPr/>
+      </p:sp>
+      <p:sp>
+        <p:nvSpPr>
+          <p:cNvPr id="3" name="Notes Placeholder 2"/>
+          <p:cNvSpPr>
+            <a:spLocks noGrp="1"/>
+          </p:cNvSpPr>
+          <p:nvPr>
+            <p:ph type="body" idx="1"/>
+          </p:nvPr>
+        </p:nvSpPr>
+        <p:spPr/>
+        <p:txBody>
+          <a:bodyPr/>
+          <a:lstStyle/>
+          <a:p>
+            <a:pPr marL="228600" indent="-228600">
+              <a:buAutoNum type="arabicPeriod"/>
+            </a:pPr>
+            <a:r>
+              <a:rPr lang="en-GB" dirty="0" smtClean="0"/>
+              <a:t>Introduction</a:t>
+            </a:r>
+            <a:r>
+              <a:rPr lang="en-GB" baseline="0" dirty="0" smtClean="0"/>
+              <a:t> on V-developing models, and their refinement for intermediate stage verification </a:t>
+            </a:r>
+          </a:p>
+          <a:p>
+            <a:pPr marL="228600" indent="-228600">
+              <a:buAutoNum type="arabicPeriod"/>
+            </a:pPr>
+            <a:endParaRPr lang="en-GB" baseline="0" dirty="0" smtClean="0"/>
+          </a:p>
+          <a:p>
+            <a:pPr marL="228600" indent="-228600">
+              <a:buAutoNum type="arabicPeriod"/>
+            </a:pPr>
+            <a:r>
+              <a:rPr lang="en-GB" dirty="0" smtClean="0"/>
+              <a:t>General</a:t>
+            </a:r>
+            <a:r>
+              <a:rPr lang="en-GB" baseline="0" dirty="0" smtClean="0"/>
+              <a:t> discussion about system requirements, their features and why their specification represents a challenging stage</a:t>
+            </a:r>
+          </a:p>
+          <a:p>
+            <a:pPr marL="228600" indent="-228600">
+              <a:buAutoNum type="arabicPeriod"/>
+            </a:pPr>
+            <a:endParaRPr lang="en-GB" baseline="0" dirty="0" smtClean="0"/>
+          </a:p>
+          <a:p>
+            <a:pPr marL="228600" indent="-228600">
+              <a:buAutoNum type="arabicPeriod"/>
+            </a:pPr>
+            <a:r>
+              <a:rPr lang="en-GB" baseline="0" dirty="0" smtClean="0"/>
+              <a:t>Very small discussion about formal languages, in particular Signal Temporal Logic, just to give hints of what is needed for formal verification. The most important thing is that we will see how they can be abstracted, so how we exploit their potentialities without directly using them.</a:t>
+            </a:r>
+          </a:p>
+          <a:p>
+            <a:pPr marL="228600" indent="-228600">
+              <a:buAutoNum type="arabicPeriod"/>
+            </a:pPr>
+            <a:endParaRPr lang="en-GB" baseline="0" dirty="0" smtClean="0"/>
+          </a:p>
+          <a:p>
+            <a:pPr marL="228600" indent="-228600">
+              <a:buAutoNum type="arabicPeriod"/>
+            </a:pPr>
+            <a:r>
+              <a:rPr lang="en-GB" baseline="0" dirty="0" smtClean="0"/>
+              <a:t>Then we will introduce the developed framework, with its tree fundamental tools : the supporting external libraries, the requirement smart editor and, finally, a bit of the work done in frequency response property monitoring.</a:t>
+            </a:r>
+          </a:p>
+          <a:p>
+            <a:pPr marL="0" indent="0">
+              <a:buNone/>
+            </a:pPr>
+            <a:endParaRPr lang="en-GB" baseline="0" dirty="0" smtClean="0"/>
+          </a:p>
+          <a:p>
+            <a:pPr marL="228600" indent="-228600">
+              <a:buAutoNum type="arabicPeriod"/>
+            </a:pPr>
+            <a:endParaRPr lang="en-US" dirty="0"/>
+          </a:p>
+        </p:txBody>
+      </p:sp>
+      <p:sp>
+        <p:nvSpPr>
+          <p:cNvPr id="4" name="Slide Number Placeholder 3"/>
+          <p:cNvSpPr>
+            <a:spLocks noGrp="1"/>
+          </p:cNvSpPr>
+          <p:nvPr>
+            <p:ph type="sldNum" sz="quarter" idx="10"/>
+          </p:nvPr>
+        </p:nvSpPr>
+        <p:spPr/>
+        <p:txBody>
+          <a:bodyPr/>
+          <a:lstStyle/>
+          <a:p>
+            <a:fld id="{5BFBAF79-F6A6-4AA7-9DE0-E61C270CE2A0}" type="slidenum">
+              <a:rPr lang="en-US" smtClean="0"/>
+              <a:pPr/>
+              <a:t>2</a:t>
+            </a:fld>
+            <a:endParaRPr lang="en-US" dirty="0"/>
+          </a:p>
+        </p:txBody>
+      </p:sp>
+    </p:spTree>
+    <p:extLst>
+      <p:ext uri="{BB962C8B-B14F-4D97-AF65-F5344CB8AC3E}">
+        <p14:creationId xmlns:p14="http://schemas.microsoft.com/office/powerpoint/2010/main" val="3567647966"/>
+      </p:ext>
+    </p:extLst>
+  </p:cSld>
+  <p:clrMapOvr>
+    <a:masterClrMapping/>
+  </p:clrMapOvr>
+</p:notes>
+</file>
+
+<file path=ppt/notesSlides/notesSlide3.xml><?xml version="1.0" encoding="utf-8"?>
+<p:notes xmlns:a="http://schemas.openxmlformats.org/drawingml/2006/main" xmlns:r="http://schemas.openxmlformats.org/officeDocument/2006/relationships" xmlns:p="http://schemas.openxmlformats.org/presentationml/2006/main">
+  <p:cSld>
+    <p:spTree>
+      <p:nvGrpSpPr>
+        <p:cNvPr id="1" name=""/>
+        <p:cNvGrpSpPr/>
+        <p:nvPr/>
+      </p:nvGrpSpPr>
+      <p:grpSpPr>
+        <a:xfrm>
+          <a:off x="0" y="0"/>
+          <a:ext cx="0" cy="0"/>
+          <a:chOff x="0" y="0"/>
+          <a:chExt cx="0" cy="0"/>
+        </a:xfrm>
+      </p:grpSpPr>
+      <p:sp>
+        <p:nvSpPr>
+          <p:cNvPr id="2" name="Slide Image Placeholder 1"/>
+          <p:cNvSpPr>
+            <a:spLocks noGrp="1" noRot="1" noChangeAspect="1"/>
+          </p:cNvSpPr>
+          <p:nvPr>
+            <p:ph type="sldImg"/>
+          </p:nvPr>
+        </p:nvSpPr>
+        <p:spPr/>
+      </p:sp>
+      <p:sp>
+        <p:nvSpPr>
+          <p:cNvPr id="3" name="Notes Placeholder 2"/>
+          <p:cNvSpPr>
+            <a:spLocks noGrp="1"/>
+          </p:cNvSpPr>
+          <p:nvPr>
+            <p:ph type="body" idx="1"/>
+          </p:nvPr>
+        </p:nvSpPr>
+        <p:spPr/>
+        <p:txBody>
+          <a:bodyPr/>
+          <a:lstStyle/>
+          <a:p>
+            <a:r>
+              <a:rPr lang="en-GB" dirty="0" smtClean="0"/>
+              <a:t>I suppose that many of you are familiar</a:t>
+            </a:r>
+            <a:r>
+              <a:rPr lang="en-GB" baseline="0" dirty="0" smtClean="0"/>
+              <a:t> with V-Model, for those not, activities on the left side regards the development, those on the right side the testing and verification</a:t>
+            </a:r>
+          </a:p>
+          <a:p>
+            <a:endParaRPr lang="en-GB" baseline="0" dirty="0" smtClean="0"/>
+          </a:p>
+          <a:p>
+            <a:r>
+              <a:rPr lang="en-GB" baseline="0" dirty="0" smtClean="0"/>
+              <a:t>Sometimes this model is further expanded, and it is possible to apply it at every stage, especially for what regards the system-level requirements thy can follow their own development process to ensure</a:t>
+            </a:r>
+          </a:p>
+          <a:p>
+            <a:r>
+              <a:rPr lang="en-GB" baseline="0" dirty="0" smtClean="0"/>
+              <a:t>Their completeness ad correctness.</a:t>
+            </a:r>
+          </a:p>
+          <a:p>
+            <a:endParaRPr lang="en-GB" baseline="0" dirty="0" smtClean="0"/>
+          </a:p>
+          <a:p>
+            <a:endParaRPr lang="en-GB" baseline="0" dirty="0" smtClean="0"/>
+          </a:p>
+          <a:p>
+            <a:r>
+              <a:rPr lang="en-GB" baseline="0" dirty="0" smtClean="0"/>
+              <a:t>As you probably already understood, in this work we are focusing on the first levels of the v-model, providing a tool for typing system-level requirements and their verification</a:t>
+            </a:r>
+          </a:p>
+          <a:p>
+            <a:endParaRPr lang="en-GB" baseline="0" dirty="0" smtClean="0"/>
+          </a:p>
+          <a:p>
+            <a:endParaRPr lang="en-US" dirty="0"/>
+          </a:p>
+        </p:txBody>
+      </p:sp>
+      <p:sp>
+        <p:nvSpPr>
+          <p:cNvPr id="4" name="Slide Number Placeholder 3"/>
+          <p:cNvSpPr>
+            <a:spLocks noGrp="1"/>
+          </p:cNvSpPr>
+          <p:nvPr>
+            <p:ph type="sldNum" sz="quarter" idx="10"/>
+          </p:nvPr>
+        </p:nvSpPr>
+        <p:spPr/>
+        <p:txBody>
+          <a:bodyPr/>
+          <a:lstStyle/>
+          <a:p>
+            <a:fld id="{5BFBAF79-F6A6-4AA7-9DE0-E61C270CE2A0}" type="slidenum">
+              <a:rPr lang="en-US" smtClean="0"/>
+              <a:pPr/>
+              <a:t>3</a:t>
+            </a:fld>
+            <a:endParaRPr lang="en-US" dirty="0"/>
+          </a:p>
+        </p:txBody>
+      </p:sp>
+    </p:spTree>
+    <p:extLst>
+      <p:ext uri="{BB962C8B-B14F-4D97-AF65-F5344CB8AC3E}">
+        <p14:creationId xmlns:p14="http://schemas.microsoft.com/office/powerpoint/2010/main" val="1267449024"/>
+      </p:ext>
+    </p:extLst>
+  </p:cSld>
+  <p:clrMapOvr>
+    <a:masterClrMapping/>
+  </p:clrMapOvr>
+</p:notes>
+</file>
+
+<file path=ppt/notesSlides/notesSlide4.xml><?xml version="1.0" encoding="utf-8"?>
+<p:notes xmlns:a="http://schemas.openxmlformats.org/drawingml/2006/main" xmlns:r="http://schemas.openxmlformats.org/officeDocument/2006/relationships" xmlns:p="http://schemas.openxmlformats.org/presentationml/2006/main">
+  <p:cSld>
+    <p:spTree>
+      <p:nvGrpSpPr>
+        <p:cNvPr id="1" name=""/>
+        <p:cNvGrpSpPr/>
+        <p:nvPr/>
+      </p:nvGrpSpPr>
+      <p:grpSpPr>
+        <a:xfrm>
+          <a:off x="0" y="0"/>
+          <a:ext cx="0" cy="0"/>
+          <a:chOff x="0" y="0"/>
+          <a:chExt cx="0" cy="0"/>
+        </a:xfrm>
+      </p:grpSpPr>
+      <p:sp>
+        <p:nvSpPr>
+          <p:cNvPr id="2" name="Slide Image Placeholder 1"/>
+          <p:cNvSpPr>
+            <a:spLocks noGrp="1" noRot="1" noChangeAspect="1"/>
+          </p:cNvSpPr>
+          <p:nvPr>
+            <p:ph type="sldImg"/>
+          </p:nvPr>
+        </p:nvSpPr>
+        <p:spPr/>
+      </p:sp>
+      <p:sp>
+        <p:nvSpPr>
+          <p:cNvPr id="3" name="Notes Placeholder 2"/>
+          <p:cNvSpPr>
+            <a:spLocks noGrp="1"/>
+          </p:cNvSpPr>
+          <p:nvPr>
+            <p:ph type="body" idx="1"/>
+          </p:nvPr>
+        </p:nvSpPr>
+        <p:spPr/>
+        <p:txBody>
+          <a:bodyPr>
+            <a:normAutofit lnSpcReduction="10000"/>
+          </a:bodyPr>
+          <a:lstStyle/>
+          <a:p>
+            <a:r>
+              <a:rPr lang="en-GB" dirty="0" smtClean="0"/>
+              <a:t>In particular, we focus on the domain of</a:t>
+            </a:r>
+            <a:r>
+              <a:rPr lang="en-GB" baseline="0" dirty="0" smtClean="0"/>
+              <a:t> control systems, targeting, in particular, performance requirements.</a:t>
+            </a:r>
+          </a:p>
+          <a:p>
+            <a:endParaRPr lang="en-GB" baseline="0" dirty="0" smtClean="0"/>
+          </a:p>
+          <a:p>
+            <a:r>
+              <a:rPr lang="en-GB" baseline="0" dirty="0" smtClean="0"/>
+              <a:t>They are also known as top-level requirements since they refer the system from an high level of abstraction. They can be divided in time domain (left) and frequency domain (right)</a:t>
+            </a:r>
+          </a:p>
+          <a:p>
+            <a:endParaRPr lang="en-GB" baseline="0" dirty="0" smtClean="0"/>
+          </a:p>
+          <a:p>
+            <a:r>
+              <a:rPr lang="en-GB" baseline="0" dirty="0" smtClean="0"/>
+              <a:t>Time domains property are usually defined with the assumption of a step input (the command)</a:t>
+            </a:r>
+          </a:p>
+          <a:p>
+            <a:endParaRPr lang="en-GB" baseline="0" dirty="0" smtClean="0"/>
+          </a:p>
+          <a:p>
+            <a:r>
+              <a:rPr lang="en-GB" baseline="0" dirty="0" smtClean="0"/>
+              <a:t>Overshoot: telling how much the output of the system is going beyond the reference (or command). Usually requirements on overshoot aim to verify that it is less than a maximum allowed value</a:t>
+            </a:r>
+          </a:p>
+          <a:p>
+            <a:endParaRPr lang="en-GB" baseline="0" dirty="0" smtClean="0"/>
+          </a:p>
+          <a:p>
+            <a:pPr marL="0" marR="0" indent="0" algn="l" defTabSz="914400" rtl="0" eaLnBrk="1" fontAlgn="auto" latinLnBrk="0" hangingPunct="1">
+              <a:lnSpc>
+                <a:spcPct val="100000"/>
+              </a:lnSpc>
+              <a:spcBef>
+                <a:spcPts val="0"/>
+              </a:spcBef>
+              <a:spcAft>
+                <a:spcPts val="0"/>
+              </a:spcAft>
+              <a:buClrTx/>
+              <a:buSzTx/>
+              <a:buFontTx/>
+              <a:buNone/>
+              <a:tabLst/>
+              <a:defRPr/>
+            </a:pPr>
+            <a:r>
+              <a:rPr lang="en-GB" baseline="0" dirty="0" smtClean="0"/>
+              <a:t>Rise time: telling how “fast” the system is responding. Usually requirements on rise time aim to verify that the output of the systems reaches a percentage of the command in less than a certain amount of time</a:t>
+            </a:r>
+          </a:p>
+          <a:p>
+            <a:pPr marL="0" marR="0" indent="0" algn="l" defTabSz="914400" rtl="0" eaLnBrk="1" fontAlgn="auto" latinLnBrk="0" hangingPunct="1">
+              <a:lnSpc>
+                <a:spcPct val="100000"/>
+              </a:lnSpc>
+              <a:spcBef>
+                <a:spcPts val="0"/>
+              </a:spcBef>
+              <a:spcAft>
+                <a:spcPts val="0"/>
+              </a:spcAft>
+              <a:buClrTx/>
+              <a:buSzTx/>
+              <a:buFontTx/>
+              <a:buNone/>
+              <a:tabLst/>
+              <a:defRPr/>
+            </a:pPr>
+            <a:endParaRPr lang="en-GB" baseline="0" dirty="0" smtClean="0"/>
+          </a:p>
+          <a:p>
+            <a:pPr marL="0" marR="0" indent="0" algn="l" defTabSz="914400" rtl="0" eaLnBrk="1" fontAlgn="auto" latinLnBrk="0" hangingPunct="1">
+              <a:lnSpc>
+                <a:spcPct val="100000"/>
+              </a:lnSpc>
+              <a:spcBef>
+                <a:spcPts val="0"/>
+              </a:spcBef>
+              <a:spcAft>
+                <a:spcPts val="0"/>
+              </a:spcAft>
+              <a:buClrTx/>
+              <a:buSzTx/>
+              <a:buFontTx/>
+              <a:buNone/>
+              <a:tabLst/>
+              <a:defRPr/>
+            </a:pPr>
+            <a:endParaRPr lang="en-GB" baseline="0" dirty="0" smtClean="0"/>
+          </a:p>
+          <a:p>
+            <a:pPr marL="0" marR="0" indent="0" algn="l" defTabSz="914400" rtl="0" eaLnBrk="1" fontAlgn="auto" latinLnBrk="0" hangingPunct="1">
+              <a:lnSpc>
+                <a:spcPct val="100000"/>
+              </a:lnSpc>
+              <a:spcBef>
+                <a:spcPts val="0"/>
+              </a:spcBef>
+              <a:spcAft>
+                <a:spcPts val="0"/>
+              </a:spcAft>
+              <a:buClrTx/>
+              <a:buSzTx/>
+              <a:buFontTx/>
+              <a:buNone/>
+              <a:tabLst/>
+              <a:defRPr/>
+            </a:pPr>
+            <a:r>
+              <a:rPr lang="en-GB" baseline="0" dirty="0" smtClean="0"/>
+              <a:t>Settling time: telling how “fast” the system reaches the steady state value. Usually requirements on settling time ensure that after the command reception, within a certain amount of time the system outputs is bounded in whit a certain tolerance</a:t>
+            </a:r>
+          </a:p>
+          <a:p>
+            <a:pPr marL="0" marR="0" indent="0" algn="l" defTabSz="914400" rtl="0" eaLnBrk="1" fontAlgn="auto" latinLnBrk="0" hangingPunct="1">
+              <a:lnSpc>
+                <a:spcPct val="100000"/>
+              </a:lnSpc>
+              <a:spcBef>
+                <a:spcPts val="0"/>
+              </a:spcBef>
+              <a:spcAft>
+                <a:spcPts val="0"/>
+              </a:spcAft>
+              <a:buClrTx/>
+              <a:buSzTx/>
+              <a:buFontTx/>
+              <a:buNone/>
+              <a:tabLst/>
+              <a:defRPr/>
+            </a:pPr>
+            <a:endParaRPr lang="en-GB" baseline="0" dirty="0" smtClean="0"/>
+          </a:p>
+          <a:p>
+            <a:pPr marL="0" marR="0" indent="0" algn="l" defTabSz="914400" rtl="0" eaLnBrk="1" fontAlgn="auto" latinLnBrk="0" hangingPunct="1">
+              <a:lnSpc>
+                <a:spcPct val="100000"/>
+              </a:lnSpc>
+              <a:spcBef>
+                <a:spcPts val="0"/>
+              </a:spcBef>
+              <a:spcAft>
+                <a:spcPts val="0"/>
+              </a:spcAft>
+              <a:buClrTx/>
+              <a:buSzTx/>
+              <a:buFontTx/>
+              <a:buNone/>
+              <a:tabLst/>
+              <a:defRPr/>
+            </a:pPr>
+            <a:r>
+              <a:rPr lang="en-GB" baseline="0" dirty="0" smtClean="0"/>
+              <a:t>For all of them we can define their complementary, i.e. undershoot and fall time</a:t>
+            </a:r>
+          </a:p>
+          <a:p>
+            <a:pPr marL="0" marR="0" indent="0" algn="l" defTabSz="914400" rtl="0" eaLnBrk="1" fontAlgn="auto" latinLnBrk="0" hangingPunct="1">
+              <a:lnSpc>
+                <a:spcPct val="100000"/>
+              </a:lnSpc>
+              <a:spcBef>
+                <a:spcPts val="0"/>
+              </a:spcBef>
+              <a:spcAft>
+                <a:spcPts val="0"/>
+              </a:spcAft>
+              <a:buClrTx/>
+              <a:buSzTx/>
+              <a:buFontTx/>
+              <a:buNone/>
+              <a:tabLst/>
+              <a:defRPr/>
+            </a:pPr>
+            <a:endParaRPr lang="en-GB" baseline="0" dirty="0" smtClean="0"/>
+          </a:p>
+          <a:p>
+            <a:pPr marL="0" marR="0" indent="0" algn="l" defTabSz="914400" rtl="0" eaLnBrk="1" fontAlgn="auto" latinLnBrk="0" hangingPunct="1">
+              <a:lnSpc>
+                <a:spcPct val="100000"/>
+              </a:lnSpc>
+              <a:spcBef>
+                <a:spcPts val="0"/>
+              </a:spcBef>
+              <a:spcAft>
+                <a:spcPts val="0"/>
+              </a:spcAft>
+              <a:buClrTx/>
+              <a:buSzTx/>
+              <a:buFontTx/>
+              <a:buNone/>
+              <a:tabLst/>
+              <a:defRPr/>
+            </a:pPr>
+            <a:r>
+              <a:rPr lang="en-GB" baseline="0" dirty="0" smtClean="0"/>
+              <a:t>For what concerns frequency response we can have </a:t>
+            </a:r>
+          </a:p>
+          <a:p>
+            <a:pPr marL="0" marR="0" indent="0" algn="l" defTabSz="914400" rtl="0" eaLnBrk="1" fontAlgn="auto" latinLnBrk="0" hangingPunct="1">
+              <a:lnSpc>
+                <a:spcPct val="100000"/>
+              </a:lnSpc>
+              <a:spcBef>
+                <a:spcPts val="0"/>
+              </a:spcBef>
+              <a:spcAft>
+                <a:spcPts val="0"/>
+              </a:spcAft>
+              <a:buClrTx/>
+              <a:buSzTx/>
+              <a:buFontTx/>
+              <a:buNone/>
+              <a:tabLst/>
+              <a:defRPr/>
+            </a:pPr>
+            <a:endParaRPr lang="en-GB" baseline="0" dirty="0" smtClean="0"/>
+          </a:p>
+          <a:p>
+            <a:pPr marL="0" marR="0" indent="0" algn="l" defTabSz="914400" rtl="0" eaLnBrk="1" fontAlgn="auto" latinLnBrk="0" hangingPunct="1">
+              <a:lnSpc>
+                <a:spcPct val="100000"/>
+              </a:lnSpc>
+              <a:spcBef>
+                <a:spcPts val="0"/>
+              </a:spcBef>
+              <a:spcAft>
+                <a:spcPts val="0"/>
+              </a:spcAft>
+              <a:buClrTx/>
+              <a:buSzTx/>
+              <a:buFontTx/>
+              <a:buNone/>
+              <a:tabLst/>
+              <a:defRPr/>
+            </a:pPr>
+            <a:r>
+              <a:rPr lang="en-GB" baseline="0" dirty="0" smtClean="0"/>
+              <a:t>Gain margin : telling the amount of gain increase or decrease that makes the system unstable</a:t>
+            </a:r>
+          </a:p>
+          <a:p>
+            <a:pPr marL="0" marR="0" indent="0" algn="l" defTabSz="914400" rtl="0" eaLnBrk="1" fontAlgn="auto" latinLnBrk="0" hangingPunct="1">
+              <a:lnSpc>
+                <a:spcPct val="100000"/>
+              </a:lnSpc>
+              <a:spcBef>
+                <a:spcPts val="0"/>
+              </a:spcBef>
+              <a:spcAft>
+                <a:spcPts val="0"/>
+              </a:spcAft>
+              <a:buClrTx/>
+              <a:buSzTx/>
+              <a:buFontTx/>
+              <a:buNone/>
+              <a:tabLst/>
+              <a:defRPr/>
+            </a:pPr>
+            <a:r>
+              <a:rPr lang="en-GB" baseline="0" dirty="0" smtClean="0"/>
+              <a:t>Phase margin</a:t>
+            </a:r>
+          </a:p>
+          <a:p>
+            <a:pPr marL="0" marR="0" indent="0" algn="l" defTabSz="914400" rtl="0" eaLnBrk="1" fontAlgn="auto" latinLnBrk="0" hangingPunct="1">
+              <a:lnSpc>
+                <a:spcPct val="100000"/>
+              </a:lnSpc>
+              <a:spcBef>
+                <a:spcPts val="0"/>
+              </a:spcBef>
+              <a:spcAft>
+                <a:spcPts val="0"/>
+              </a:spcAft>
+              <a:buClrTx/>
+              <a:buSzTx/>
+              <a:buFontTx/>
+              <a:buNone/>
+              <a:tabLst/>
+              <a:defRPr/>
+            </a:pPr>
+            <a:endParaRPr lang="en-GB" baseline="0" dirty="0" smtClean="0"/>
+          </a:p>
+          <a:p>
+            <a:pPr marL="0" marR="0" indent="0" algn="l" defTabSz="914400" rtl="0" eaLnBrk="1" fontAlgn="auto" latinLnBrk="0" hangingPunct="1">
+              <a:lnSpc>
+                <a:spcPct val="100000"/>
+              </a:lnSpc>
+              <a:spcBef>
+                <a:spcPts val="0"/>
+              </a:spcBef>
+              <a:spcAft>
+                <a:spcPts val="0"/>
+              </a:spcAft>
+              <a:buClrTx/>
+              <a:buSzTx/>
+              <a:buFontTx/>
+              <a:buNone/>
+              <a:tabLst/>
+              <a:defRPr/>
+            </a:pPr>
+            <a:endParaRPr lang="en-GB" baseline="0" dirty="0" smtClean="0"/>
+          </a:p>
+          <a:p>
+            <a:endParaRPr lang="en-GB" baseline="0" dirty="0" smtClean="0"/>
+          </a:p>
+          <a:p>
+            <a:endParaRPr lang="en-GB" baseline="0" dirty="0" smtClean="0"/>
+          </a:p>
+          <a:p>
+            <a:endParaRPr lang="en-US" dirty="0"/>
+          </a:p>
+        </p:txBody>
+      </p:sp>
+      <p:sp>
+        <p:nvSpPr>
+          <p:cNvPr id="4" name="Slide Number Placeholder 3"/>
+          <p:cNvSpPr>
+            <a:spLocks noGrp="1"/>
+          </p:cNvSpPr>
+          <p:nvPr>
+            <p:ph type="sldNum" sz="quarter" idx="10"/>
+          </p:nvPr>
+        </p:nvSpPr>
+        <p:spPr/>
+        <p:txBody>
+          <a:bodyPr/>
+          <a:lstStyle/>
+          <a:p>
+            <a:fld id="{5BFBAF79-F6A6-4AA7-9DE0-E61C270CE2A0}" type="slidenum">
+              <a:rPr lang="en-US" smtClean="0"/>
+              <a:pPr/>
+              <a:t>4</a:t>
+            </a:fld>
+            <a:endParaRPr lang="en-US" dirty="0"/>
+          </a:p>
+        </p:txBody>
+      </p:sp>
+    </p:spTree>
+    <p:extLst>
+      <p:ext uri="{BB962C8B-B14F-4D97-AF65-F5344CB8AC3E}">
+        <p14:creationId xmlns:p14="http://schemas.microsoft.com/office/powerpoint/2010/main" val="3110199410"/>
       </p:ext>
     </p:extLst>
   </p:cSld>
@@ -19410,11 +20102,6 @@
               </a:rPr>
               <a:t>R</a:t>
             </a:r>
-            <a:endParaRPr lang="en-GB" sz="1600" b="1" i="1" dirty="0" smtClean="0">
-              <a:latin typeface="Lato" panose="020F0502020204030203" pitchFamily="34" charset="0"/>
-              <a:ea typeface="Lato" panose="020F0502020204030203" pitchFamily="34" charset="0"/>
-              <a:cs typeface="Lato" panose="020F0502020204030203" pitchFamily="34" charset="0"/>
-            </a:endParaRPr>
           </a:p>
         </p:txBody>
       </p:sp>
@@ -19462,31 +20149,7 @@
                 <a:ea typeface="Lato" panose="020F0502020204030203" pitchFamily="34" charset="0"/>
                 <a:cs typeface="Lato" panose="020F0502020204030203" pitchFamily="34" charset="0"/>
               </a:rPr>
-              <a:t>(</a:t>
-            </a:r>
-            <a:r>
-              <a:rPr lang="en-GB" i="1" dirty="0" smtClean="0">
-                <a:latin typeface="Lato" panose="020F0502020204030203" pitchFamily="34" charset="0"/>
-                <a:ea typeface="Lato" panose="020F0502020204030203" pitchFamily="34" charset="0"/>
-                <a:cs typeface="Lato" panose="020F0502020204030203" pitchFamily="34" charset="0"/>
-              </a:rPr>
-              <a:t>e.g</a:t>
-            </a:r>
-            <a:r>
-              <a:rPr lang="en-GB" i="1" dirty="0" smtClean="0">
-                <a:latin typeface="Lato" panose="020F0502020204030203" pitchFamily="34" charset="0"/>
-                <a:ea typeface="Lato" panose="020F0502020204030203" pitchFamily="34" charset="0"/>
-                <a:cs typeface="Lato" panose="020F0502020204030203" pitchFamily="34" charset="0"/>
-              </a:rPr>
-              <a:t>. </a:t>
-            </a:r>
-            <a:r>
-              <a:rPr lang="en-GB" i="1" dirty="0" smtClean="0">
-                <a:latin typeface="Lato" panose="020F0502020204030203" pitchFamily="34" charset="0"/>
-                <a:ea typeface="Lato" panose="020F0502020204030203" pitchFamily="34" charset="0"/>
-                <a:cs typeface="Lato" panose="020F0502020204030203" pitchFamily="34" charset="0"/>
-              </a:rPr>
-              <a:t>Control systems):</a:t>
+              <a:t>(e.g. Control systems):</a:t>
             </a:r>
           </a:p>
           <a:p>
@@ -20207,8 +20870,8 @@
           </a:p>
         </p:txBody>
       </p:sp>
-      <mc:AlternateContent xmlns:mc="http://schemas.openxmlformats.org/markup-compatibility/2006">
-        <mc:Choice xmlns:a14="http://schemas.microsoft.com/office/drawing/2010/main" Requires="a14">
+      <mc:AlternateContent xmlns:mc="http://schemas.openxmlformats.org/markup-compatibility/2006" xmlns:a14="http://schemas.microsoft.com/office/drawing/2010/main">
+        <mc:Choice Requires="a14">
           <p:sp>
             <p:nvSpPr>
               <p:cNvPr id="9" name="Rectangle 8"/>
@@ -20244,23 +20907,7 @@
                     <a:ea typeface="Lato" panose="020F0502020204030203" pitchFamily="34" charset="0"/>
                     <a:cs typeface="Lato" panose="020F0502020204030203" pitchFamily="34" charset="0"/>
                   </a:rPr>
-                  <a:t>is a rigorous formalism allowing to express property referring signals in continuous </a:t>
-                </a:r>
-                <a:r>
-                  <a:rPr lang="en-GB" dirty="0">
-                    <a:latin typeface="+mj-lt"/>
-                    <a:ea typeface="Lato" panose="020F0502020204030203" pitchFamily="34" charset="0"/>
-                    <a:cs typeface="Lato" panose="020F0502020204030203" pitchFamily="34" charset="0"/>
-                  </a:rPr>
-                  <a:t>time </a:t>
-                </a:r>
-                <a:r>
-                  <a:rPr lang="en-GB" dirty="0">
-                    <a:latin typeface="+mj-lt"/>
-                    <a:ea typeface="Lato" panose="020F0502020204030203" pitchFamily="34" charset="0"/>
-                    <a:cs typeface="Lato" panose="020F0502020204030203" pitchFamily="34" charset="0"/>
-                  </a:rPr>
-                  <a:t>domain.</a:t>
+                  <a:t>is a rigorous formalism allowing to express property referring signals in continuous time domain.</a:t>
                 </a:r>
               </a:p>
               <a:p>
@@ -20293,7 +20940,7 @@
                       <m:sSubPr>
                         <m:ctrlPr>
                           <a:rPr lang="en-GB" i="1">
-                            <a:latin typeface="+mj-lt"/>
+                            <a:latin typeface="Cambria Math"/>
                             <a:ea typeface="Lato" panose="020F0502020204030203" pitchFamily="34" charset="0"/>
                             <a:cs typeface="Lato" panose="020F0502020204030203" pitchFamily="34" charset="0"/>
                           </a:rPr>
@@ -20302,7 +20949,7 @@
                       <m:e>
                         <m:r>
                           <a:rPr lang="en-GB" i="1">
-                            <a:latin typeface="+mj-lt"/>
+                            <a:latin typeface="Cambria Math"/>
                             <a:ea typeface="Lato" panose="020F0502020204030203" pitchFamily="34" charset="0"/>
                             <a:cs typeface="Lato" panose="020F0502020204030203" pitchFamily="34" charset="0"/>
                           </a:rPr>
@@ -20313,7 +20960,7 @@
                             <m:lit/>
                           </m:rPr>
                           <a:rPr lang="en-GB" i="1">
-                            <a:latin typeface="+mj-lt"/>
+                            <a:latin typeface="Cambria Math"/>
                             <a:ea typeface="Lato" panose="020F0502020204030203" pitchFamily="34" charset="0"/>
                             <a:cs typeface="Lato" panose="020F0502020204030203" pitchFamily="34" charset="0"/>
                           </a:rPr>
@@ -20321,7 +20968,7 @@
                         </m:r>
                         <m:r>
                           <a:rPr lang="en-GB" i="1">
-                            <a:latin typeface="+mj-lt"/>
+                            <a:latin typeface="Cambria Math"/>
                             <a:ea typeface="Lato" panose="020F0502020204030203" pitchFamily="34" charset="0"/>
                             <a:cs typeface="Lato" panose="020F0502020204030203" pitchFamily="34" charset="0"/>
                           </a:rPr>
@@ -20331,7 +20978,7 @@
                       <m:sub>
                         <m:r>
                           <a:rPr lang="en-GB" i="1">
-                            <a:latin typeface="+mj-lt"/>
+                            <a:latin typeface="Cambria Math"/>
                             <a:ea typeface="Lato" panose="020F0502020204030203" pitchFamily="34" charset="0"/>
                             <a:cs typeface="Lato" panose="020F0502020204030203" pitchFamily="34" charset="0"/>
                           </a:rPr>
@@ -20339,7 +20986,7 @@
                         </m:r>
                         <m:r>
                           <a:rPr lang="en-GB" i="1">
-                            <a:latin typeface="+mj-lt"/>
+                            <a:latin typeface="Cambria Math"/>
                             <a:ea typeface="Lato" panose="020F0502020204030203" pitchFamily="34" charset="0"/>
                             <a:cs typeface="Lato" panose="020F0502020204030203" pitchFamily="34" charset="0"/>
                           </a:rPr>
@@ -20347,7 +20994,7 @@
                         </m:r>
                         <m:r>
                           <a:rPr lang="en-GB" i="1">
-                            <a:latin typeface="+mj-lt"/>
+                            <a:latin typeface="Cambria Math"/>
                             <a:ea typeface="Lato" panose="020F0502020204030203" pitchFamily="34" charset="0"/>
                             <a:cs typeface="Lato" panose="020F0502020204030203" pitchFamily="34" charset="0"/>
                           </a:rPr>
@@ -20355,7 +21002,7 @@
                         </m:r>
                         <m:r>
                           <a:rPr lang="en-GB" i="1">
-                            <a:latin typeface="+mj-lt"/>
+                            <a:latin typeface="Cambria Math"/>
                             <a:ea typeface="Lato" panose="020F0502020204030203" pitchFamily="34" charset="0"/>
                             <a:cs typeface="Lato" panose="020F0502020204030203" pitchFamily="34" charset="0"/>
                           </a:rPr>
@@ -20363,7 +21010,7 @@
                         </m:r>
                         <m:r>
                           <a:rPr lang="en-GB" i="1">
-                            <a:latin typeface="+mj-lt"/>
+                            <a:latin typeface="Cambria Math"/>
                             <a:ea typeface="Lato" panose="020F0502020204030203" pitchFamily="34" charset="0"/>
                             <a:cs typeface="Lato" panose="020F0502020204030203" pitchFamily="34" charset="0"/>
                           </a:rPr>
@@ -20377,7 +21024,7 @@
                         <m:endChr m:val=""/>
                         <m:ctrlPr>
                           <a:rPr lang="en-GB" i="1">
-                            <a:latin typeface="+mj-lt"/>
+                            <a:latin typeface="Cambria Math"/>
                             <a:ea typeface="Lato" panose="020F0502020204030203" pitchFamily="34" charset="0"/>
                             <a:cs typeface="Lato" panose="020F0502020204030203" pitchFamily="34" charset="0"/>
                           </a:rPr>
@@ -20386,7 +21033,7 @@
                       <m:e>
                         <m:r>
                           <a:rPr lang="en-GB" i="1">
-                            <a:latin typeface="+mj-lt"/>
+                            <a:latin typeface="Cambria Math"/>
                             <a:ea typeface="Lato" panose="020F0502020204030203" pitchFamily="34" charset="0"/>
                             <a:cs typeface="Lato" panose="020F0502020204030203" pitchFamily="34" charset="0"/>
                           </a:rPr>
@@ -20394,7 +21041,7 @@
                         </m:r>
                         <m:r>
                           <a:rPr lang="en-GB" i="1">
-                            <a:latin typeface="+mj-lt"/>
+                            <a:latin typeface="Cambria Math"/>
                             <a:ea typeface="Cambria Math"/>
                             <a:cs typeface="Lato" panose="020F0502020204030203" pitchFamily="34" charset="0"/>
                           </a:rPr>
@@ -20404,7 +21051,7 @@
                           <m:dPr>
                             <m:ctrlPr>
                               <a:rPr lang="en-GB" i="1">
-                                <a:latin typeface="+mj-lt"/>
+                                <a:latin typeface="Cambria Math"/>
                                 <a:ea typeface="Cambria Math"/>
                                 <a:cs typeface="Lato" panose="020F0502020204030203" pitchFamily="34" charset="0"/>
                               </a:rPr>
@@ -20413,7 +21060,7 @@
                           <m:e>
                             <m:r>
                               <a:rPr lang="en-GB" i="1">
-                                <a:latin typeface="+mj-lt"/>
+                                <a:latin typeface="Cambria Math"/>
                                 <a:ea typeface="Cambria Math"/>
                                 <a:cs typeface="Lato" panose="020F0502020204030203" pitchFamily="34" charset="0"/>
                               </a:rPr>
@@ -20421,7 +21068,7 @@
                             </m:r>
                             <m:r>
                               <a:rPr lang="en-GB" i="1">
-                                <a:latin typeface="+mj-lt"/>
+                                <a:latin typeface="Cambria Math"/>
                                 <a:ea typeface="Cambria Math"/>
                                 <a:cs typeface="Lato" panose="020F0502020204030203" pitchFamily="34" charset="0"/>
                               </a:rPr>
@@ -20431,7 +21078,7 @@
                               <m:sSubPr>
                                 <m:ctrlPr>
                                   <a:rPr lang="en-GB" i="1">
-                                    <a:latin typeface="+mj-lt"/>
+                                    <a:latin typeface="Cambria Math"/>
                                     <a:ea typeface="Cambria Math"/>
                                     <a:cs typeface="Lato" panose="020F0502020204030203" pitchFamily="34" charset="0"/>
                                   </a:rPr>
@@ -20440,7 +21087,7 @@
                               <m:e>
                                 <m:r>
                                   <a:rPr lang="en-GB" i="1">
-                                    <a:latin typeface="+mj-lt"/>
+                                    <a:latin typeface="Cambria Math"/>
                                     <a:ea typeface="Cambria Math"/>
                                     <a:cs typeface="Lato" panose="020F0502020204030203" pitchFamily="34" charset="0"/>
                                   </a:rPr>
@@ -20450,7 +21097,7 @@
                               <m:sub>
                                 <m:r>
                                   <a:rPr lang="en-GB" i="1">
-                                    <a:latin typeface="+mj-lt"/>
+                                    <a:latin typeface="Cambria Math"/>
                                     <a:ea typeface="Cambria Math"/>
                                     <a:cs typeface="Lato" panose="020F0502020204030203" pitchFamily="34" charset="0"/>
                                   </a:rPr>
@@ -20460,7 +21107,7 @@
                             </m:sSub>
                             <m:r>
                               <a:rPr lang="en-GB" i="1">
-                                <a:latin typeface="+mj-lt"/>
+                                <a:latin typeface="Cambria Math"/>
                                 <a:ea typeface="Cambria Math"/>
                                 <a:cs typeface="Lato" panose="020F0502020204030203" pitchFamily="34" charset="0"/>
                               </a:rPr>
@@ -20470,7 +21117,7 @@
                               <m:sSubPr>
                                 <m:ctrlPr>
                                   <a:rPr lang="en-GB" i="1">
-                                    <a:latin typeface="+mj-lt"/>
+                                    <a:latin typeface="Cambria Math"/>
                                     <a:ea typeface="Cambria Math"/>
                                     <a:cs typeface="Lato" panose="020F0502020204030203" pitchFamily="34" charset="0"/>
                                   </a:rPr>
@@ -20479,7 +21126,7 @@
                               <m:e>
                                 <m:r>
                                   <a:rPr lang="en-GB" i="1">
-                                    <a:latin typeface="+mj-lt"/>
+                                    <a:latin typeface="Cambria Math"/>
                                     <a:ea typeface="Cambria Math"/>
                                     <a:cs typeface="Lato" panose="020F0502020204030203" pitchFamily="34" charset="0"/>
                                   </a:rPr>
@@ -20489,7 +21136,7 @@
                               <m:sub>
                                 <m:r>
                                   <a:rPr lang="en-GB" i="1">
-                                    <a:latin typeface="+mj-lt"/>
+                                    <a:latin typeface="Cambria Math"/>
                                     <a:ea typeface="Cambria Math"/>
                                     <a:cs typeface="Lato" panose="020F0502020204030203" pitchFamily="34" charset="0"/>
                                   </a:rPr>
@@ -20501,7 +21148,7 @@
                         </m:d>
                         <m:r>
                           <a:rPr lang="en-GB" i="1">
-                            <a:latin typeface="+mj-lt"/>
+                            <a:latin typeface="Cambria Math"/>
                             <a:ea typeface="Cambria Math"/>
                             <a:cs typeface="Lato" panose="020F0502020204030203" pitchFamily="34" charset="0"/>
                           </a:rPr>
@@ -20547,14 +21194,14 @@
                       <m:sSubPr>
                         <m:ctrlPr>
                           <a:rPr lang="en-US" i="1">
-                            <a:latin typeface="+mj-lt"/>
+                            <a:latin typeface="Cambria Math"/>
                           </a:rPr>
                         </m:ctrlPr>
                       </m:sSubPr>
                       <m:e>
                         <m:r>
                           <a:rPr lang="en-GB" i="1">
-                            <a:latin typeface="+mj-lt"/>
+                            <a:latin typeface="Cambria Math"/>
                           </a:rPr>
                           <m:t>𝐸𝑣𝑒𝑛𝑡𝑢𝑎𝑙𝑙𝑦</m:t>
                         </m:r>
@@ -20566,26 +21213,26 @@
                             <m:endChr m:val="]"/>
                             <m:ctrlPr>
                               <a:rPr lang="en-US" i="1">
-                                <a:latin typeface="+mj-lt"/>
+                                <a:latin typeface="Cambria Math"/>
                               </a:rPr>
                             </m:ctrlPr>
                           </m:dPr>
                           <m:e>
                             <m:r>
                               <a:rPr lang="en-GB" i="1">
-                                <a:latin typeface="+mj-lt"/>
+                                <a:latin typeface="Cambria Math"/>
                               </a:rPr>
                               <m:t>𝑎</m:t>
                             </m:r>
                             <m:r>
                               <a:rPr lang="en-GB" i="1">
-                                <a:latin typeface="+mj-lt"/>
+                                <a:latin typeface="Cambria Math"/>
                               </a:rPr>
                               <m:t>,  </m:t>
                             </m:r>
                             <m:r>
                               <a:rPr lang="en-GB" i="1">
-                                <a:latin typeface="+mj-lt"/>
+                                <a:latin typeface="Cambria Math"/>
                               </a:rPr>
                               <m:t>𝑏</m:t>
                             </m:r>
@@ -20595,32 +21242,26 @@
                     </m:sSub>
                     <m:r>
                       <a:rPr lang="en-GB" i="1">
-                        <a:latin typeface="+mj-lt"/>
+                        <a:latin typeface="Cambria Math"/>
                       </a:rPr>
                       <m:t>  </m:t>
                     </m:r>
                     <m:r>
                       <a:rPr lang="en-GB" i="1">
-                        <a:latin typeface="+mj-lt"/>
+                        <a:latin typeface="Cambria Math"/>
                         <a:sym typeface="Symbol"/>
                       </a:rPr>
                       <m:t></m:t>
                     </m:r>
                     <m:r>
                       <a:rPr lang="en-GB" i="1">
-                        <a:latin typeface="+mj-lt"/>
+                        <a:latin typeface="Cambria Math"/>
                       </a:rPr>
-                      <m:t> </m:t>
+                      <m:t>  </m:t>
                     </m:r>
                     <m:r>
                       <a:rPr lang="en-GB" i="1">
-                        <a:latin typeface="+mj-lt"/>
-                      </a:rPr>
-                      <m:t> </m:t>
-                    </m:r>
-                    <m:r>
-                      <a:rPr lang="en-GB" i="1">
-                        <a:latin typeface="+mj-lt"/>
+                        <a:latin typeface="Cambria Math"/>
                         <a:ea typeface="Cambria Math"/>
                         <a:sym typeface="Symbol"/>
                       </a:rPr>
@@ -20628,26 +21269,26 @@
                     </m:r>
                     <m:r>
                       <a:rPr lang="en-GB" i="1">
-                        <a:latin typeface="+mj-lt"/>
+                        <a:latin typeface="Cambria Math"/>
                       </a:rPr>
                       <m:t> </m:t>
                     </m:r>
                     <m:r>
                       <a:rPr lang="en-GB" i="1">
-                        <a:latin typeface="+mj-lt"/>
+                        <a:latin typeface="Cambria Math"/>
                       </a:rPr>
                       <m:t>𝑡</m:t>
                     </m:r>
                     <m:r>
                       <a:rPr lang="en-GB" i="1">
-                        <a:latin typeface="+mj-lt"/>
+                        <a:latin typeface="Cambria Math"/>
                         <a:sym typeface="Symbol"/>
                       </a:rPr>
                       <m:t></m:t>
                     </m:r>
                     <m:r>
                       <a:rPr lang="en-GB" i="1">
-                        <a:latin typeface="+mj-lt"/>
+                        <a:latin typeface="Cambria Math"/>
                       </a:rPr>
                       <m:t> </m:t>
                     </m:r>
@@ -20657,32 +21298,26 @@
                         <m:endChr m:val="]"/>
                         <m:ctrlPr>
                           <a:rPr lang="en-US" i="1">
-                            <a:latin typeface="+mj-lt"/>
+                            <a:latin typeface="Cambria Math"/>
                           </a:rPr>
                         </m:ctrlPr>
                       </m:dPr>
                       <m:e>
                         <m:r>
                           <a:rPr lang="en-GB" i="1">
-                            <a:latin typeface="+mj-lt"/>
+                            <a:latin typeface="Cambria Math"/>
                           </a:rPr>
                           <m:t>𝑎</m:t>
                         </m:r>
                         <m:r>
                           <a:rPr lang="en-GB" i="1">
-                            <a:latin typeface="+mj-lt"/>
+                            <a:latin typeface="Cambria Math"/>
                           </a:rPr>
-                          <m:t>,</m:t>
+                          <m:t>, </m:t>
                         </m:r>
                         <m:r>
                           <a:rPr lang="en-GB" i="1">
-                            <a:latin typeface="+mj-lt"/>
-                          </a:rPr>
-                          <m:t> </m:t>
-                        </m:r>
-                        <m:r>
-                          <a:rPr lang="en-GB" i="1">
-                            <a:latin typeface="+mj-lt"/>
+                            <a:latin typeface="Cambria Math"/>
                           </a:rPr>
                           <m:t>𝑏</m:t>
                         </m:r>
@@ -20711,14 +21346,14 @@
                       <m:sSubPr>
                         <m:ctrlPr>
                           <a:rPr lang="en-GB" i="1">
-                            <a:latin typeface="+mj-lt"/>
+                            <a:latin typeface="Cambria Math"/>
                           </a:rPr>
                         </m:ctrlPr>
                       </m:sSubPr>
                       <m:e>
                         <m:r>
                           <a:rPr lang="en-GB" i="1">
-                            <a:latin typeface="+mj-lt"/>
+                            <a:latin typeface="Cambria Math"/>
                           </a:rPr>
                           <m:t>𝐴𝑙𝑤𝑎𝑦𝑠</m:t>
                         </m:r>
@@ -20730,26 +21365,26 @@
                             <m:endChr m:val="]"/>
                             <m:ctrlPr>
                               <a:rPr lang="en-US" i="1">
-                                <a:latin typeface="+mj-lt"/>
+                                <a:latin typeface="Cambria Math"/>
                               </a:rPr>
                             </m:ctrlPr>
                           </m:dPr>
                           <m:e>
                             <m:r>
                               <a:rPr lang="en-GB" i="1">
-                                <a:latin typeface="+mj-lt"/>
+                                <a:latin typeface="Cambria Math"/>
                               </a:rPr>
                               <m:t>𝑎</m:t>
                             </m:r>
                             <m:r>
                               <a:rPr lang="en-GB" i="1">
-                                <a:latin typeface="+mj-lt"/>
+                                <a:latin typeface="Cambria Math"/>
                               </a:rPr>
                               <m:t>,  </m:t>
                             </m:r>
                             <m:r>
                               <a:rPr lang="en-GB" i="1">
-                                <a:latin typeface="+mj-lt"/>
+                                <a:latin typeface="Cambria Math"/>
                               </a:rPr>
                               <m:t>𝑏</m:t>
                             </m:r>
@@ -20759,26 +21394,26 @@
                     </m:sSub>
                     <m:r>
                       <a:rPr lang="en-GB" i="1">
-                        <a:latin typeface="+mj-lt"/>
+                        <a:latin typeface="Cambria Math"/>
                       </a:rPr>
                       <m:t>          </m:t>
                     </m:r>
                     <m:r>
                       <a:rPr lang="en-GB" i="1">
-                        <a:latin typeface="+mj-lt"/>
+                        <a:latin typeface="Cambria Math"/>
                         <a:sym typeface="Symbol"/>
                       </a:rPr>
                       <m:t></m:t>
                     </m:r>
                     <m:r>
                       <a:rPr lang="en-GB" i="1">
-                        <a:latin typeface="+mj-lt"/>
+                        <a:latin typeface="Cambria Math"/>
                       </a:rPr>
                       <m:t>  </m:t>
                     </m:r>
                     <m:r>
                       <a:rPr lang="en-GB" i="1">
-                        <a:latin typeface="+mj-lt"/>
+                        <a:latin typeface="Cambria Math"/>
                         <a:ea typeface="Cambria Math"/>
                         <a:sym typeface="Symbol"/>
                       </a:rPr>
@@ -20786,26 +21421,26 @@
                     </m:r>
                     <m:r>
                       <a:rPr lang="en-GB" i="1">
-                        <a:latin typeface="+mj-lt"/>
+                        <a:latin typeface="Cambria Math"/>
                       </a:rPr>
                       <m:t> </m:t>
                     </m:r>
                     <m:r>
                       <a:rPr lang="en-GB" i="1">
-                        <a:latin typeface="+mj-lt"/>
+                        <a:latin typeface="Cambria Math"/>
                       </a:rPr>
                       <m:t>𝑡</m:t>
                     </m:r>
                     <m:r>
                       <a:rPr lang="en-GB" i="1">
-                        <a:latin typeface="+mj-lt"/>
+                        <a:latin typeface="Cambria Math"/>
                         <a:sym typeface="Symbol"/>
                       </a:rPr>
                       <m:t></m:t>
                     </m:r>
                     <m:r>
                       <a:rPr lang="en-GB" i="1">
-                        <a:latin typeface="+mj-lt"/>
+                        <a:latin typeface="Cambria Math"/>
                       </a:rPr>
                       <m:t> </m:t>
                     </m:r>
@@ -20815,26 +21450,26 @@
                         <m:endChr m:val="]"/>
                         <m:ctrlPr>
                           <a:rPr lang="en-US" i="1">
-                            <a:latin typeface="+mj-lt"/>
+                            <a:latin typeface="Cambria Math"/>
                           </a:rPr>
                         </m:ctrlPr>
                       </m:dPr>
                       <m:e>
                         <m:r>
                           <a:rPr lang="en-GB" i="1">
-                            <a:latin typeface="+mj-lt"/>
+                            <a:latin typeface="Cambria Math"/>
                           </a:rPr>
                           <m:t>𝑎</m:t>
                         </m:r>
                         <m:r>
                           <a:rPr lang="en-GB" i="1">
-                            <a:latin typeface="+mj-lt"/>
+                            <a:latin typeface="Cambria Math"/>
                           </a:rPr>
                           <m:t>, </m:t>
                         </m:r>
                         <m:r>
                           <a:rPr lang="en-GB" i="1">
-                            <a:latin typeface="+mj-lt"/>
+                            <a:latin typeface="Cambria Math"/>
                           </a:rPr>
                           <m:t>𝑏</m:t>
                         </m:r>
@@ -20855,15 +21490,7 @@
                     <a:ea typeface="Lato" panose="020F0502020204030203" pitchFamily="34" charset="0"/>
                     <a:cs typeface="Lato" panose="020F0502020204030203" pitchFamily="34" charset="0"/>
                   </a:rPr>
-                  <a:t>	</a:t>
-                </a:r>
-                <a:r>
-                  <a:rPr lang="en-GB" dirty="0">
-                    <a:latin typeface="+mj-lt"/>
-                    <a:ea typeface="Lato" panose="020F0502020204030203" pitchFamily="34" charset="0"/>
-                    <a:cs typeface="Lato" panose="020F0502020204030203" pitchFamily="34" charset="0"/>
-                  </a:rPr>
-                  <a:t>	</a:t>
+                  <a:t>		</a:t>
                 </a:r>
               </a:p>
               <a:p>
@@ -20887,7 +21514,7 @@
                   <m:oMath xmlns:m="http://schemas.openxmlformats.org/officeDocument/2006/math">
                     <m:r>
                       <a:rPr lang="en-GB" i="1">
-                        <a:latin typeface="+mj-lt"/>
+                        <a:latin typeface="Cambria Math"/>
                         <a:ea typeface="Cambria Math"/>
                         <a:cs typeface="Lato" panose="020F0502020204030203" pitchFamily="34" charset="0"/>
                       </a:rPr>
@@ -20895,7 +21522,7 @@
                     </m:r>
                     <m:r>
                       <a:rPr lang="en-GB" i="1">
-                        <a:latin typeface="+mj-lt"/>
+                        <a:latin typeface="Cambria Math"/>
                         <a:ea typeface="Cambria Math"/>
                         <a:cs typeface="Lato" panose="020F0502020204030203" pitchFamily="34" charset="0"/>
                       </a:rPr>
@@ -20905,7 +21532,7 @@
                       <m:sSupPr>
                         <m:ctrlPr>
                           <a:rPr lang="en-GB" i="1">
-                            <a:latin typeface="+mj-lt"/>
+                            <a:latin typeface="Cambria Math"/>
                             <a:ea typeface="Cambria Math"/>
                             <a:cs typeface="Lato" panose="020F0502020204030203" pitchFamily="34" charset="0"/>
                           </a:rPr>
@@ -20914,7 +21541,7 @@
                       <m:e>
                         <m:r>
                           <a:rPr lang="en-GB" i="1">
-                            <a:latin typeface="+mj-lt"/>
+                            <a:latin typeface="Cambria Math"/>
                             <a:ea typeface="Cambria Math"/>
                             <a:cs typeface="Lato" panose="020F0502020204030203" pitchFamily="34" charset="0"/>
                           </a:rPr>
@@ -20924,7 +21551,7 @@
                       <m:sup>
                         <m:r>
                           <a:rPr lang="en-GB" i="1">
-                            <a:latin typeface="+mj-lt"/>
+                            <a:latin typeface="Cambria Math"/>
                             <a:ea typeface="Cambria Math"/>
                             <a:cs typeface="Lato" panose="020F0502020204030203" pitchFamily="34" charset="0"/>
                           </a:rPr>
@@ -20934,7 +21561,7 @@
                     </m:sSup>
                     <m:r>
                       <a:rPr lang="en-GB" i="1">
-                        <a:latin typeface="+mj-lt"/>
+                        <a:latin typeface="Cambria Math"/>
                         <a:ea typeface="Cambria Math"/>
                         <a:cs typeface="Lato" panose="020F0502020204030203" pitchFamily="34" charset="0"/>
                       </a:rPr>
@@ -20968,7 +21595,7 @@
                     <m:oMath xmlns:m="http://schemas.openxmlformats.org/officeDocument/2006/math">
                       <m:r>
                         <a:rPr lang="en-GB" i="1" dirty="0">
-                          <a:latin typeface="+mj-lt"/>
+                          <a:latin typeface="Cambria Math"/>
                           <a:ea typeface="Lato" panose="020F0502020204030203" pitchFamily="34" charset="0"/>
                           <a:cs typeface="Lato" panose="020F0502020204030203" pitchFamily="34" charset="0"/>
                         </a:rPr>
@@ -20976,7 +21603,7 @@
                       </m:r>
                       <m:r>
                         <a:rPr lang="en-GB" i="1" dirty="0">
-                          <a:latin typeface="+mj-lt"/>
+                          <a:latin typeface="Cambria Math"/>
                           <a:ea typeface="Lato" panose="020F0502020204030203" pitchFamily="34" charset="0"/>
                           <a:cs typeface="Lato" panose="020F0502020204030203" pitchFamily="34" charset="0"/>
                         </a:rPr>
@@ -20986,7 +21613,7 @@
                         <m:dPr>
                           <m:ctrlPr>
                             <a:rPr lang="en-GB" i="1" dirty="0">
-                              <a:latin typeface="+mj-lt"/>
+                              <a:latin typeface="Cambria Math"/>
                               <a:ea typeface="Lato" panose="020F0502020204030203" pitchFamily="34" charset="0"/>
                               <a:cs typeface="Lato" panose="020F0502020204030203" pitchFamily="34" charset="0"/>
                             </a:rPr>
@@ -20995,7 +21622,7 @@
                         <m:e>
                           <m:r>
                             <a:rPr lang="en-GB" i="1" dirty="0">
-                              <a:latin typeface="+mj-lt"/>
+                              <a:latin typeface="Cambria Math"/>
                               <a:ea typeface="Lato" panose="020F0502020204030203" pitchFamily="34" charset="0"/>
                               <a:cs typeface="Lato" panose="020F0502020204030203" pitchFamily="34" charset="0"/>
                             </a:rPr>
@@ -21003,7 +21630,7 @@
                           </m:r>
                           <m:r>
                             <a:rPr lang="en-GB" i="1" dirty="0">
-                              <a:latin typeface="+mj-lt"/>
+                              <a:latin typeface="Cambria Math"/>
                               <a:ea typeface="Lato" panose="020F0502020204030203" pitchFamily="34" charset="0"/>
                               <a:cs typeface="Lato" panose="020F0502020204030203" pitchFamily="34" charset="0"/>
                             </a:rPr>
@@ -21011,7 +21638,7 @@
                           </m:r>
                           <m:r>
                             <a:rPr lang="en-GB" i="1" dirty="0">
-                              <a:latin typeface="+mj-lt"/>
+                              <a:latin typeface="Cambria Math"/>
                               <a:ea typeface="Lato" panose="020F0502020204030203" pitchFamily="34" charset="0"/>
                               <a:cs typeface="Lato" panose="020F0502020204030203" pitchFamily="34" charset="0"/>
                             </a:rPr>
@@ -21021,7 +21648,7 @@
                       </m:d>
                       <m:r>
                         <a:rPr lang="en-GB" i="1" dirty="0">
-                          <a:latin typeface="+mj-lt"/>
+                          <a:latin typeface="Cambria Math"/>
                           <a:ea typeface="Lato" panose="020F0502020204030203" pitchFamily="34" charset="0"/>
                           <a:cs typeface="Lato" panose="020F0502020204030203" pitchFamily="34" charset="0"/>
                         </a:rPr>
@@ -21031,7 +21658,7 @@
                         <m:dPr>
                           <m:ctrlPr>
                             <a:rPr lang="en-GB" i="1" dirty="0">
-                              <a:latin typeface="+mj-lt"/>
+                              <a:latin typeface="Cambria Math"/>
                               <a:ea typeface="Lato" panose="020F0502020204030203" pitchFamily="34" charset="0"/>
                               <a:cs typeface="Lato" panose="020F0502020204030203" pitchFamily="34" charset="0"/>
                             </a:rPr>
@@ -21040,7 +21667,7 @@
                         <m:e>
                           <m:r>
                             <a:rPr lang="en-GB" i="1" dirty="0">
-                              <a:latin typeface="+mj-lt"/>
+                              <a:latin typeface="Cambria Math"/>
                               <a:ea typeface="Lato" panose="020F0502020204030203" pitchFamily="34" charset="0"/>
                               <a:cs typeface="Lato" panose="020F0502020204030203" pitchFamily="34" charset="0"/>
                             </a:rPr>
@@ -21048,7 +21675,7 @@
                           </m:r>
                           <m:r>
                             <a:rPr lang="en-GB" i="1" dirty="0">
-                              <a:latin typeface="+mj-lt"/>
+                              <a:latin typeface="Cambria Math"/>
                               <a:ea typeface="Lato" panose="020F0502020204030203" pitchFamily="34" charset="0"/>
                               <a:cs typeface="Lato" panose="020F0502020204030203" pitchFamily="34" charset="0"/>
                             </a:rPr>
@@ -21056,7 +21683,7 @@
                           </m:r>
                           <m:r>
                             <a:rPr lang="en-GB" i="1" dirty="0">
-                              <a:latin typeface="+mj-lt"/>
+                              <a:latin typeface="Cambria Math"/>
                               <a:ea typeface="Lato" panose="020F0502020204030203" pitchFamily="34" charset="0"/>
                               <a:cs typeface="Lato" panose="020F0502020204030203" pitchFamily="34" charset="0"/>
                             </a:rPr>
@@ -21064,7 +21691,7 @@
                           </m:r>
                           <m:r>
                             <a:rPr lang="en-GB" i="1" dirty="0">
-                              <a:latin typeface="+mj-lt"/>
+                              <a:latin typeface="Cambria Math"/>
                               <a:ea typeface="Lato" panose="020F0502020204030203" pitchFamily="34" charset="0"/>
                               <a:cs typeface="Lato" panose="020F0502020204030203" pitchFamily="34" charset="0"/>
                             </a:rPr>
@@ -21072,7 +21699,7 @@
                           </m:r>
                           <m:r>
                             <a:rPr lang="en-GB" i="1" dirty="0">
-                              <a:latin typeface="+mj-lt"/>
+                              <a:latin typeface="Cambria Math"/>
                               <a:ea typeface="Lato" panose="020F0502020204030203" pitchFamily="34" charset="0"/>
                               <a:cs typeface="Lato" panose="020F0502020204030203" pitchFamily="34" charset="0"/>
                             </a:rPr>
@@ -21099,13 +21726,13 @@
                     <m:oMath xmlns:m="http://schemas.openxmlformats.org/officeDocument/2006/math">
                       <m:r>
                         <a:rPr lang="en-GB" i="1">
-                          <a:latin typeface="+mj-lt"/>
+                          <a:latin typeface="Cambria Math"/>
                         </a:rPr>
                         <m:t>    </m:t>
                       </m:r>
                       <m:r>
                         <a:rPr lang="en-GB" i="1">
-                          <a:latin typeface="+mj-lt"/>
+                          <a:latin typeface="Cambria Math"/>
                         </a:rPr>
                         <m:t>𝑔𝑟𝑒𝑎𝑡𝑒𝑟</m:t>
                       </m:r>
@@ -21113,26 +21740,26 @@
                         <m:dPr>
                           <m:ctrlPr>
                             <a:rPr lang="en-GB" i="1">
-                              <a:latin typeface="+mj-lt"/>
+                              <a:latin typeface="Cambria Math"/>
                             </a:rPr>
                           </m:ctrlPr>
                         </m:dPr>
                         <m:e>
                           <m:r>
                             <a:rPr lang="en-GB" i="1">
-                              <a:latin typeface="+mj-lt"/>
+                              <a:latin typeface="Cambria Math"/>
                             </a:rPr>
                             <m:t>𝑥</m:t>
                           </m:r>
                           <m:r>
                             <a:rPr lang="en-GB" i="1">
-                              <a:latin typeface="+mj-lt"/>
+                              <a:latin typeface="Cambria Math"/>
                             </a:rPr>
                             <m:t>, </m:t>
                           </m:r>
                           <m:r>
                             <a:rPr lang="en-GB" i="1">
-                              <a:latin typeface="+mj-lt"/>
+                              <a:latin typeface="Cambria Math"/>
                             </a:rPr>
                             <m:t>𝛼</m:t>
                           </m:r>
@@ -21143,13 +21770,13 @@
                           <m:lit/>
                         </m:rPr>
                         <a:rPr lang="en-GB" i="1">
-                          <a:latin typeface="+mj-lt"/>
+                          <a:latin typeface="Cambria Math"/>
                         </a:rPr>
                         <m:t> </m:t>
                       </m:r>
                       <m:r>
                         <a:rPr lang="en-GB" i="1">
-                          <a:latin typeface="+mj-lt"/>
+                          <a:latin typeface="Cambria Math"/>
                         </a:rPr>
                         <m:t>  ≡ </m:t>
                       </m:r>
@@ -21157,38 +21784,38 @@
                         <m:dPr>
                           <m:ctrlPr>
                             <a:rPr lang="en-GB" i="1">
-                              <a:latin typeface="+mj-lt"/>
+                              <a:latin typeface="Cambria Math"/>
                             </a:rPr>
                           </m:ctrlPr>
                         </m:dPr>
                         <m:e>
                           <m:r>
                             <a:rPr lang="en-GB" i="1">
-                              <a:latin typeface="+mj-lt"/>
+                              <a:latin typeface="Cambria Math"/>
                             </a:rPr>
                             <m:t> </m:t>
                           </m:r>
                           <m:r>
                             <a:rPr lang="en-GB" i="1">
-                              <a:latin typeface="+mj-lt"/>
+                              <a:latin typeface="Cambria Math"/>
                             </a:rPr>
                             <m:t>𝑥</m:t>
                           </m:r>
                           <m:r>
                             <a:rPr lang="en-GB" i="1">
-                              <a:latin typeface="+mj-lt"/>
+                              <a:latin typeface="Cambria Math"/>
                             </a:rPr>
                             <m:t>&gt;</m:t>
                           </m:r>
                           <m:r>
                             <a:rPr lang="en-GB" i="1">
-                              <a:latin typeface="+mj-lt"/>
+                              <a:latin typeface="Cambria Math"/>
                             </a:rPr>
                             <m:t>𝛼</m:t>
                           </m:r>
                           <m:r>
                             <a:rPr lang="en-GB" i="1">
-                              <a:latin typeface="+mj-lt"/>
+                              <a:latin typeface="Cambria Math"/>
                             </a:rPr>
                             <m:t> </m:t>
                           </m:r>
@@ -21211,7 +21838,7 @@
                     <m:oMath xmlns:m="http://schemas.openxmlformats.org/officeDocument/2006/math">
                       <m:r>
                         <a:rPr lang="en-GB" i="1" dirty="0">
-                          <a:latin typeface="+mj-lt"/>
+                          <a:latin typeface="Cambria Math"/>
                           <a:ea typeface="Lato" panose="020F0502020204030203" pitchFamily="34" charset="0"/>
                           <a:cs typeface="Lato" panose="020F0502020204030203" pitchFamily="34" charset="0"/>
                         </a:rPr>
@@ -21219,7 +21846,7 @@
                       </m:r>
                       <m:r>
                         <a:rPr lang="en-GB" i="1" dirty="0">
-                          <a:latin typeface="+mj-lt"/>
+                          <a:latin typeface="Cambria Math"/>
                           <a:ea typeface="Lato" panose="020F0502020204030203" pitchFamily="34" charset="0"/>
                           <a:cs typeface="Lato" panose="020F0502020204030203" pitchFamily="34" charset="0"/>
                         </a:rPr>
@@ -21229,7 +21856,7 @@
                         <m:dPr>
                           <m:ctrlPr>
                             <a:rPr lang="en-GB" i="1" dirty="0">
-                              <a:latin typeface="+mj-lt"/>
+                              <a:latin typeface="Cambria Math"/>
                               <a:ea typeface="Lato" panose="020F0502020204030203" pitchFamily="34" charset="0"/>
                               <a:cs typeface="Lato" panose="020F0502020204030203" pitchFamily="34" charset="0"/>
                             </a:rPr>
@@ -21238,7 +21865,7 @@
                         <m:e>
                           <m:r>
                             <a:rPr lang="en-GB" i="1" dirty="0">
-                              <a:latin typeface="+mj-lt"/>
+                              <a:latin typeface="Cambria Math"/>
                               <a:ea typeface="Lato" panose="020F0502020204030203" pitchFamily="34" charset="0"/>
                               <a:cs typeface="Lato" panose="020F0502020204030203" pitchFamily="34" charset="0"/>
                             </a:rPr>
@@ -21246,7 +21873,7 @@
                           </m:r>
                           <m:r>
                             <a:rPr lang="en-GB" i="1" dirty="0">
-                              <a:latin typeface="+mj-lt"/>
+                              <a:latin typeface="Cambria Math"/>
                               <a:ea typeface="Lato" panose="020F0502020204030203" pitchFamily="34" charset="0"/>
                               <a:cs typeface="Lato" panose="020F0502020204030203" pitchFamily="34" charset="0"/>
                             </a:rPr>
@@ -21254,7 +21881,7 @@
                           </m:r>
                           <m:r>
                             <a:rPr lang="en-GB" i="1" dirty="0">
-                              <a:latin typeface="+mj-lt"/>
+                              <a:latin typeface="Cambria Math"/>
                               <a:ea typeface="Lato" panose="020F0502020204030203" pitchFamily="34" charset="0"/>
                               <a:cs typeface="Lato" panose="020F0502020204030203" pitchFamily="34" charset="0"/>
                             </a:rPr>
@@ -21264,33 +21891,17 @@
                       </m:d>
                       <m:r>
                         <a:rPr lang="en-GB" i="1" dirty="0">
-                          <a:latin typeface="+mj-lt"/>
+                          <a:latin typeface="Cambria Math"/>
                           <a:ea typeface="Lato" panose="020F0502020204030203" pitchFamily="34" charset="0"/>
                           <a:cs typeface="Lato" panose="020F0502020204030203" pitchFamily="34" charset="0"/>
                         </a:rPr>
-                        <m:t>  </m:t>
-                      </m:r>
-                      <m:r>
-                        <a:rPr lang="en-GB" i="1" dirty="0">
-                          <a:latin typeface="+mj-lt"/>
-                          <a:ea typeface="Lato" panose="020F0502020204030203" pitchFamily="34" charset="0"/>
-                          <a:cs typeface="Lato" panose="020F0502020204030203" pitchFamily="34" charset="0"/>
-                        </a:rPr>
-                        <m:t>≡</m:t>
-                      </m:r>
-                      <m:r>
-                        <a:rPr lang="en-GB" i="1" dirty="0">
-                          <a:latin typeface="+mj-lt"/>
-                          <a:ea typeface="Lato" panose="020F0502020204030203" pitchFamily="34" charset="0"/>
-                          <a:cs typeface="Lato" panose="020F0502020204030203" pitchFamily="34" charset="0"/>
-                        </a:rPr>
-                        <m:t> </m:t>
+                        <m:t>  ≡ </m:t>
                       </m:r>
                       <m:d>
                         <m:dPr>
                           <m:ctrlPr>
                             <a:rPr lang="en-GB" i="1" dirty="0">
-                              <a:latin typeface="+mj-lt"/>
+                              <a:latin typeface="Cambria Math"/>
                               <a:ea typeface="Lato" panose="020F0502020204030203" pitchFamily="34" charset="0"/>
                               <a:cs typeface="Lato" panose="020F0502020204030203" pitchFamily="34" charset="0"/>
                             </a:rPr>
@@ -21299,7 +21910,7 @@
                         <m:e>
                           <m:r>
                             <a:rPr lang="en-GB" i="1" dirty="0">
-                              <a:latin typeface="+mj-lt"/>
+                              <a:latin typeface="Cambria Math"/>
                               <a:ea typeface="Lato" panose="020F0502020204030203" pitchFamily="34" charset="0"/>
                               <a:cs typeface="Lato" panose="020F0502020204030203" pitchFamily="34" charset="0"/>
                             </a:rPr>
@@ -21307,7 +21918,7 @@
                           </m:r>
                           <m:r>
                             <a:rPr lang="en-GB" i="1" dirty="0">
-                              <a:latin typeface="+mj-lt"/>
+                              <a:latin typeface="Cambria Math"/>
                               <a:ea typeface="Lato" panose="020F0502020204030203" pitchFamily="34" charset="0"/>
                               <a:cs typeface="Lato" panose="020F0502020204030203" pitchFamily="34" charset="0"/>
                             </a:rPr>
@@ -21317,7 +21928,7 @@
                             <m:dPr>
                               <m:ctrlPr>
                                 <a:rPr lang="en-GB" i="1" dirty="0">
-                                  <a:latin typeface="+mj-lt"/>
+                                  <a:latin typeface="Cambria Math"/>
                                   <a:ea typeface="Lato" panose="020F0502020204030203" pitchFamily="34" charset="0"/>
                                   <a:cs typeface="Lato" panose="020F0502020204030203" pitchFamily="34" charset="0"/>
                                 </a:rPr>
@@ -21326,19 +21937,19 @@
                             <m:e>
                               <m:r>
                                 <a:rPr lang="en-GB" i="1">
-                                  <a:latin typeface="+mj-lt"/>
+                                  <a:latin typeface="Cambria Math"/>
                                 </a:rPr>
                                 <m:t>𝑥</m:t>
                               </m:r>
                               <m:r>
                                 <a:rPr lang="en-GB" i="1">
-                                  <a:latin typeface="+mj-lt"/>
+                                  <a:latin typeface="Cambria Math"/>
                                 </a:rPr>
                                 <m:t>,</m:t>
                               </m:r>
                               <m:r>
                                 <a:rPr lang="en-GB" i="1">
-                                  <a:latin typeface="+mj-lt"/>
+                                  <a:latin typeface="Cambria Math"/>
                                 </a:rPr>
                                 <m:t>𝛼</m:t>
                               </m:r>
@@ -21346,13 +21957,13 @@
                           </m:d>
                           <m:r>
                             <a:rPr lang="en-GB" i="1">
-                              <a:latin typeface="+mj-lt"/>
+                              <a:latin typeface="Cambria Math"/>
                             </a:rPr>
                             <m:t>∧</m:t>
                           </m:r>
                           <m:r>
                             <a:rPr lang="en-GB" i="1">
-                              <a:latin typeface="+mj-lt"/>
+                              <a:latin typeface="Cambria Math"/>
                             </a:rPr>
                             <m:t>𝑔𝑟𝑒𝑎𝑡𝑒𝑟</m:t>
                           </m:r>
@@ -21360,35 +21971,28 @@
                             <m:dPr>
                               <m:ctrlPr>
                                 <a:rPr lang="en-GB" i="1">
-                                  <a:latin typeface="+mj-lt"/>
+                                  <a:latin typeface="Cambria Math"/>
                                 </a:rPr>
                               </m:ctrlPr>
                             </m:dPr>
                             <m:e>
                               <m:r>
                                 <a:rPr lang="en-GB" i="1">
-                                  <a:latin typeface="+mj-lt"/>
+                                  <a:latin typeface="Cambria Math"/>
                                   <a:ea typeface="Cambria Math"/>
                                 </a:rPr>
                                 <m:t>𝑥</m:t>
                               </m:r>
                               <m:r>
                                 <a:rPr lang="en-GB" i="1">
-                                  <a:latin typeface="+mj-lt"/>
+                                  <a:latin typeface="Cambria Math"/>
                                   <a:ea typeface="Cambria Math"/>
                                 </a:rPr>
-                                <m:t>,</m:t>
+                                <m:t>,−</m:t>
                               </m:r>
                               <m:r>
                                 <a:rPr lang="en-GB" i="1">
-                                  <a:latin typeface="+mj-lt"/>
-                                  <a:ea typeface="Cambria Math"/>
-                                </a:rPr>
-                                <m:t>−</m:t>
-                              </m:r>
-                              <m:r>
-                                <a:rPr lang="en-GB" i="1">
-                                  <a:latin typeface="+mj-lt"/>
+                                  <a:latin typeface="Cambria Math"/>
                                   <a:ea typeface="Cambria Math"/>
                                 </a:rPr>
                                 <m:t>𝛼</m:t>
@@ -21417,13 +22021,13 @@
                   <m:oMath xmlns:m="http://schemas.openxmlformats.org/officeDocument/2006/math">
                     <m:r>
                       <a:rPr lang="en-GB">
-                        <a:latin typeface="+mj-lt"/>
+                        <a:latin typeface="Cambria Math"/>
                       </a:rPr>
                       <m:t>     </m:t>
                     </m:r>
                     <m:r>
                       <a:rPr lang="en-GB" i="1">
-                        <a:latin typeface="+mj-lt"/>
+                        <a:latin typeface="Cambria Math"/>
                       </a:rPr>
                       <m:t>𝑠𝑡𝑒𝑝</m:t>
                     </m:r>
@@ -21431,26 +22035,26 @@
                       <m:dPr>
                         <m:ctrlPr>
                           <a:rPr lang="en-GB" i="1">
-                            <a:latin typeface="+mj-lt"/>
+                            <a:latin typeface="Cambria Math"/>
                           </a:rPr>
                         </m:ctrlPr>
                       </m:dPr>
                       <m:e>
                         <m:r>
                           <a:rPr lang="en-GB" i="1">
-                            <a:latin typeface="+mj-lt"/>
+                            <a:latin typeface="Cambria Math"/>
                           </a:rPr>
                           <m:t>𝑥</m:t>
                         </m:r>
                         <m:r>
                           <a:rPr lang="en-GB" i="1">
-                            <a:latin typeface="+mj-lt"/>
+                            <a:latin typeface="Cambria Math"/>
                           </a:rPr>
                           <m:t>, </m:t>
                         </m:r>
                         <m:r>
                           <a:rPr lang="en-GB" i="1">
-                            <a:latin typeface="+mj-lt"/>
+                            <a:latin typeface="Cambria Math"/>
                           </a:rPr>
                           <m:t>h</m:t>
                         </m:r>
@@ -21458,13 +22062,13 @@
                     </m:d>
                     <m:r>
                       <a:rPr lang="en-GB" i="1">
-                        <a:latin typeface="+mj-lt"/>
+                        <a:latin typeface="Cambria Math"/>
                       </a:rPr>
                       <m:t>        ≡ ( </m:t>
                     </m:r>
                     <m:r>
                       <a:rPr lang="en-GB" i="1">
-                        <a:latin typeface="+mj-lt"/>
+                        <a:latin typeface="Cambria Math"/>
                       </a:rPr>
                       <m:t>𝑔𝑟𝑒𝑎𝑡𝑒𝑟</m:t>
                     </m:r>
@@ -21472,20 +22076,20 @@
                       <m:dPr>
                         <m:ctrlPr>
                           <a:rPr lang="en-GB" i="1">
-                            <a:latin typeface="+mj-lt"/>
+                            <a:latin typeface="Cambria Math"/>
                           </a:rPr>
                         </m:ctrlPr>
                       </m:dPr>
                       <m:e>
                         <m:r>
                           <a:rPr lang="en-GB" i="1">
-                            <a:latin typeface="+mj-lt"/>
+                            <a:latin typeface="Cambria Math"/>
                           </a:rPr>
                           <m:t> </m:t>
                         </m:r>
                         <m:r>
                           <a:rPr lang="en-GB" i="1">
-                            <a:latin typeface="+mj-lt"/>
+                            <a:latin typeface="Cambria Math"/>
                           </a:rPr>
                           <m:t>𝑥</m:t>
                         </m:r>
@@ -21493,26 +22097,26 @@
                           <m:dPr>
                             <m:ctrlPr>
                               <a:rPr lang="en-GB" i="1">
-                                <a:latin typeface="+mj-lt"/>
+                                <a:latin typeface="Cambria Math"/>
                               </a:rPr>
                             </m:ctrlPr>
                           </m:dPr>
                           <m:e>
                             <m:r>
                               <a:rPr lang="en-GB" i="1">
-                                <a:latin typeface="+mj-lt"/>
+                                <a:latin typeface="Cambria Math"/>
                               </a:rPr>
                               <m:t>𝑡</m:t>
                             </m:r>
                             <m:r>
                               <a:rPr lang="en-GB" i="1">
-                                <a:latin typeface="+mj-lt"/>
+                                <a:latin typeface="Cambria Math"/>
                               </a:rPr>
                               <m:t>+</m:t>
                             </m:r>
                             <m:r>
                               <a:rPr lang="en-GB" i="1">
-                                <a:latin typeface="+mj-lt"/>
+                                <a:latin typeface="Cambria Math"/>
                               </a:rPr>
                               <m:t>𝜖</m:t>
                             </m:r>
@@ -21520,13 +22124,13 @@
                         </m:d>
                         <m:r>
                           <a:rPr lang="en-GB" i="1">
-                            <a:latin typeface="+mj-lt"/>
+                            <a:latin typeface="Cambria Math"/>
                           </a:rPr>
                           <m:t>−</m:t>
                         </m:r>
                         <m:r>
                           <a:rPr lang="en-GB" i="1">
-                            <a:latin typeface="+mj-lt"/>
+                            <a:latin typeface="Cambria Math"/>
                           </a:rPr>
                           <m:t>𝑥</m:t>
                         </m:r>
@@ -21534,14 +22138,14 @@
                           <m:dPr>
                             <m:ctrlPr>
                               <a:rPr lang="en-GB" i="1">
-                                <a:latin typeface="+mj-lt"/>
+                                <a:latin typeface="Cambria Math"/>
                               </a:rPr>
                             </m:ctrlPr>
                           </m:dPr>
                           <m:e>
                             <m:r>
                               <a:rPr lang="en-GB" i="1">
-                                <a:latin typeface="+mj-lt"/>
+                                <a:latin typeface="Cambria Math"/>
                               </a:rPr>
                               <m:t>𝑡</m:t>
                             </m:r>
@@ -21549,13 +22153,13 @@
                         </m:d>
                         <m:r>
                           <a:rPr lang="en-GB" i="1">
-                            <a:latin typeface="+mj-lt"/>
+                            <a:latin typeface="Cambria Math"/>
                           </a:rPr>
                           <m:t> ,  </m:t>
                         </m:r>
                         <m:r>
                           <a:rPr lang="en-GB" i="1">
-                            <a:latin typeface="+mj-lt"/>
+                            <a:latin typeface="Cambria Math"/>
                           </a:rPr>
                           <m:t>h</m:t>
                         </m:r>
@@ -21563,7 +22167,7 @@
                     </m:d>
                     <m:r>
                       <a:rPr lang="en-GB" i="1">
-                        <a:latin typeface="+mj-lt"/>
+                        <a:latin typeface="Cambria Math"/>
                       </a:rPr>
                       <m:t> ) </m:t>
                     </m:r>
@@ -21620,20 +22224,20 @@
                       <m:sSubPr>
                         <m:ctrlPr>
                           <a:rPr lang="en-US" i="1">
-                            <a:latin typeface="+mj-lt"/>
+                            <a:latin typeface="Cambria Math"/>
                           </a:rPr>
                         </m:ctrlPr>
                       </m:sSubPr>
                       <m:e>
                         <m:r>
                           <a:rPr lang="en-GB" i="1">
-                            <a:latin typeface="+mj-lt"/>
+                            <a:latin typeface="Cambria Math"/>
                           </a:rPr>
                           <m:t>¬</m:t>
                         </m:r>
                         <m:r>
                           <a:rPr lang="en-GB" i="1">
-                            <a:latin typeface="+mj-lt"/>
+                            <a:latin typeface="Cambria Math"/>
                           </a:rPr>
                           <m:t>𝐸𝑣𝑒𝑛𝑡𝑢𝑎𝑙𝑙𝑦</m:t>
                         </m:r>
@@ -21645,28 +22249,16 @@
                             <m:endChr m:val="]"/>
                             <m:ctrlPr>
                               <a:rPr lang="en-US" i="1">
-                                <a:latin typeface="+mj-lt"/>
+                                <a:latin typeface="Cambria Math"/>
                               </a:rPr>
                             </m:ctrlPr>
                           </m:dPr>
                           <m:e>
                             <m:r>
                               <a:rPr lang="en-GB" i="1">
-                                <a:latin typeface="+mj-lt"/>
+                                <a:latin typeface="Cambria Math"/>
                               </a:rPr>
-                              <m:t>1, </m:t>
-                            </m:r>
-                            <m:r>
-                              <a:rPr lang="en-GB" i="1">
-                                <a:latin typeface="+mj-lt"/>
-                              </a:rPr>
-                              <m:t> </m:t>
-                            </m:r>
-                            <m:r>
-                              <a:rPr lang="en-GB" i="1">
-                                <a:latin typeface="+mj-lt"/>
-                              </a:rPr>
-                              <m:t>3</m:t>
+                              <m:t>1,  3</m:t>
                             </m:r>
                           </m:e>
                         </m:d>
@@ -21674,7 +22266,7 @@
                     </m:sSub>
                     <m:r>
                       <a:rPr lang="en-GB" i="1">
-                        <a:latin typeface="+mj-lt"/>
+                        <a:latin typeface="Cambria Math"/>
                       </a:rPr>
                       <m:t> </m:t>
                     </m:r>
@@ -21684,20 +22276,20 @@
                         <m:endChr m:val="}"/>
                         <m:ctrlPr>
                           <a:rPr lang="en-GB" i="1">
-                            <a:latin typeface="+mj-lt"/>
+                            <a:latin typeface="Cambria Math"/>
                           </a:rPr>
                         </m:ctrlPr>
                       </m:dPr>
                       <m:e>
                         <m:r>
                           <a:rPr lang="en-GB" i="1">
-                            <a:latin typeface="+mj-lt"/>
+                            <a:latin typeface="Cambria Math"/>
                           </a:rPr>
                           <m:t>¬</m:t>
                         </m:r>
                         <m:r>
                           <a:rPr lang="en-GB" i="1">
-                            <a:latin typeface="+mj-lt"/>
+                            <a:latin typeface="Cambria Math"/>
                           </a:rPr>
                           <m:t>𝑏𝑜𝑢𝑛𝑑𝑒𝑑</m:t>
                         </m:r>
@@ -21705,20 +22297,20 @@
                           <m:dPr>
                             <m:ctrlPr>
                               <a:rPr lang="en-GB" i="1">
-                                <a:latin typeface="+mj-lt"/>
+                                <a:latin typeface="Cambria Math"/>
                               </a:rPr>
                             </m:ctrlPr>
                           </m:dPr>
                           <m:e>
                             <m:r>
                               <a:rPr lang="en-GB" i="1">
-                                <a:latin typeface="+mj-lt"/>
+                                <a:latin typeface="Cambria Math"/>
                               </a:rPr>
                               <m:t>𝑥</m:t>
                             </m:r>
                             <m:r>
                               <a:rPr lang="en-GB" i="1">
-                                <a:latin typeface="+mj-lt"/>
+                                <a:latin typeface="Cambria Math"/>
                               </a:rPr>
                               <m:t>,2</m:t>
                             </m:r>
@@ -21728,7 +22320,7 @@
                     </m:d>
                     <m:r>
                       <a:rPr lang="en-GB" i="1">
-                        <a:latin typeface="+mj-lt"/>
+                        <a:latin typeface="Cambria Math"/>
                         <a:ea typeface="Cambria Math"/>
                       </a:rPr>
                       <m:t>,  </m:t>
@@ -21737,20 +22329,20 @@
                       <m:sSubPr>
                         <m:ctrlPr>
                           <a:rPr lang="en-US" i="1">
-                            <a:latin typeface="+mj-lt"/>
+                            <a:latin typeface="Cambria Math"/>
                           </a:rPr>
                         </m:ctrlPr>
                       </m:sSubPr>
                       <m:e>
                         <m:r>
                           <a:rPr lang="en-GB" i="1">
-                            <a:latin typeface="+mj-lt"/>
+                            <a:latin typeface="Cambria Math"/>
                           </a:rPr>
                           <m:t> </m:t>
                         </m:r>
                         <m:r>
                           <a:rPr lang="en-GB" i="1">
-                            <a:latin typeface="+mj-lt"/>
+                            <a:latin typeface="Cambria Math"/>
                           </a:rPr>
                           <m:t>𝐴𝑙𝑤𝑎𝑦𝑠</m:t>
                         </m:r>
@@ -21762,28 +22354,16 @@
                             <m:endChr m:val="]"/>
                             <m:ctrlPr>
                               <a:rPr lang="en-US" i="1">
-                                <a:latin typeface="+mj-lt"/>
+                                <a:latin typeface="Cambria Math"/>
                               </a:rPr>
                             </m:ctrlPr>
                           </m:dPr>
                           <m:e>
                             <m:r>
                               <a:rPr lang="en-GB" i="1">
-                                <a:latin typeface="+mj-lt"/>
+                                <a:latin typeface="Cambria Math"/>
                               </a:rPr>
-                              <m:t>1,  </m:t>
-                            </m:r>
-                            <m:r>
-                              <a:rPr lang="en-GB" i="1">
-                                <a:latin typeface="+mj-lt"/>
-                              </a:rPr>
-                              <m:t> </m:t>
-                            </m:r>
-                            <m:r>
-                              <a:rPr lang="en-GB" i="1">
-                                <a:latin typeface="+mj-lt"/>
-                              </a:rPr>
-                              <m:t>3</m:t>
+                              <m:t>1,   3</m:t>
                             </m:r>
                           </m:e>
                         </m:d>
@@ -21791,31 +22371,31 @@
                     </m:sSub>
                     <m:r>
                       <a:rPr lang="en-GB" i="1">
-                        <a:latin typeface="+mj-lt"/>
+                        <a:latin typeface="Cambria Math"/>
                       </a:rPr>
                       <m:t>{</m:t>
                     </m:r>
                     <m:r>
                       <a:rPr lang="en-GB" i="1">
-                        <a:latin typeface="+mj-lt"/>
+                        <a:latin typeface="Cambria Math"/>
                       </a:rPr>
                       <m:t>𝑏𝑜𝑢𝑛𝑑𝑒𝑑</m:t>
                     </m:r>
                     <m:r>
                       <a:rPr lang="en-GB" i="1">
-                        <a:latin typeface="+mj-lt"/>
+                        <a:latin typeface="Cambria Math"/>
                       </a:rPr>
                       <m:t>(</m:t>
                     </m:r>
                     <m:r>
                       <a:rPr lang="en-GB" i="1">
-                        <a:latin typeface="+mj-lt"/>
+                        <a:latin typeface="Cambria Math"/>
                       </a:rPr>
                       <m:t>𝑥</m:t>
                     </m:r>
                     <m:r>
                       <a:rPr lang="en-GB" i="1">
-                        <a:latin typeface="+mj-lt"/>
+                        <a:latin typeface="Cambria Math"/>
                       </a:rPr>
                       <m:t>,2)}</m:t>
                     </m:r>
@@ -21838,7 +22418,7 @@
             </p:txBody>
           </p:sp>
         </mc:Choice>
-        <mc:Fallback>
+        <mc:Fallback xmlns="">
           <p:sp>
             <p:nvSpPr>
               <p:cNvPr id="9" name="Rectangle 8"/>
@@ -22562,8 +23142,8 @@
           </a:p>
         </p:txBody>
       </p:sp>
-      <mc:AlternateContent xmlns:mc="http://schemas.openxmlformats.org/markup-compatibility/2006">
-        <mc:Choice xmlns:a14="http://schemas.microsoft.com/office/drawing/2010/main" Requires="a14">
+      <mc:AlternateContent xmlns:mc="http://schemas.openxmlformats.org/markup-compatibility/2006" xmlns:a14="http://schemas.microsoft.com/office/drawing/2010/main">
+        <mc:Choice Requires="a14">
           <p:sp>
             <p:nvSpPr>
               <p:cNvPr id="9" name="Rectangle 8"/>
@@ -22616,7 +23196,7 @@
                     <m:oMath xmlns:m="http://schemas.openxmlformats.org/officeDocument/2006/math">
                       <m:r>
                         <a:rPr lang="en-GB" b="0" i="1" dirty="0" smtClean="0">
-                          <a:latin typeface="+mj-lt"/>
+                          <a:latin typeface="Cambria Math"/>
                           <a:ea typeface="Lato" panose="020F0502020204030203" pitchFamily="34" charset="0"/>
                           <a:cs typeface="Lato" panose="020F0502020204030203" pitchFamily="34" charset="0"/>
                         </a:rPr>
@@ -22626,7 +23206,7 @@
                         <m:dPr>
                           <m:ctrlPr>
                             <a:rPr lang="en-GB" b="0" i="1" dirty="0" smtClean="0">
-                              <a:latin typeface="+mj-lt"/>
+                              <a:latin typeface="Cambria Math"/>
                               <a:ea typeface="Lato" panose="020F0502020204030203" pitchFamily="34" charset="0"/>
                               <a:cs typeface="Lato" panose="020F0502020204030203" pitchFamily="34" charset="0"/>
                             </a:rPr>
@@ -22635,7 +23215,7 @@
                         <m:e>
                           <m:r>
                             <a:rPr lang="en-GB" b="0" i="1" dirty="0" smtClean="0">
-                              <a:latin typeface="+mj-lt"/>
+                              <a:latin typeface="Cambria Math"/>
                               <a:ea typeface="Lato" panose="020F0502020204030203" pitchFamily="34" charset="0"/>
                               <a:cs typeface="Lato" panose="020F0502020204030203" pitchFamily="34" charset="0"/>
                             </a:rPr>
@@ -22643,7 +23223,7 @@
                           </m:r>
                           <m:r>
                             <a:rPr lang="en-GB" b="0" i="1" dirty="0" smtClean="0">
-                              <a:latin typeface="+mj-lt"/>
+                              <a:latin typeface="Cambria Math"/>
                               <a:ea typeface="Lato" panose="020F0502020204030203" pitchFamily="34" charset="0"/>
                               <a:cs typeface="Lato" panose="020F0502020204030203" pitchFamily="34" charset="0"/>
                             </a:rPr>
@@ -22653,7 +23233,7 @@
                       </m:d>
                       <m:r>
                         <a:rPr lang="en-GB" b="0" i="1" dirty="0" smtClean="0">
-                          <a:latin typeface="+mj-lt"/>
+                          <a:latin typeface="Cambria Math"/>
                           <a:ea typeface="Cambria Math"/>
                           <a:cs typeface="Lato" panose="020F0502020204030203" pitchFamily="34" charset="0"/>
                         </a:rPr>
@@ -22680,14 +23260,14 @@
                         <m:sSubPr>
                           <m:ctrlPr>
                             <a:rPr lang="en-US" i="1" smtClean="0">
-                              <a:latin typeface="+mj-lt"/>
+                              <a:latin typeface="Cambria Math"/>
                             </a:rPr>
                           </m:ctrlPr>
                         </m:sSubPr>
                         <m:e>
                           <m:r>
                             <a:rPr lang="en-GB" b="0" i="1" smtClean="0">
-                              <a:latin typeface="+mj-lt"/>
+                              <a:latin typeface="Cambria Math"/>
                             </a:rPr>
                             <m:t>𝐸𝑣𝑒𝑛𝑡𝑢𝑎𝑙𝑙𝑦</m:t>
                           </m:r>
@@ -22699,32 +23279,32 @@
                               <m:endChr m:val="]"/>
                               <m:ctrlPr>
                                 <a:rPr lang="en-US" i="1">
-                                  <a:latin typeface="+mj-lt"/>
+                                  <a:latin typeface="Cambria Math"/>
                                 </a:rPr>
                               </m:ctrlPr>
                             </m:dPr>
                             <m:e>
                               <m:r>
                                 <a:rPr lang="en-GB" i="1">
-                                  <a:latin typeface="+mj-lt"/>
+                                  <a:latin typeface="Cambria Math"/>
                                 </a:rPr>
                                 <m:t>0,   </m:t>
                               </m:r>
                               <m:r>
                                 <a:rPr lang="en-GB" b="0" i="1" smtClean="0">
-                                  <a:latin typeface="+mj-lt"/>
+                                  <a:latin typeface="Cambria Math"/>
                                 </a:rPr>
                                 <m:t>𝑠</m:t>
                               </m:r>
                               <m:r>
                                 <a:rPr lang="en-GB" b="0" i="1" smtClean="0">
-                                  <a:latin typeface="+mj-lt"/>
+                                  <a:latin typeface="Cambria Math"/>
                                 </a:rPr>
                                 <m:t>_</m:t>
                               </m:r>
                               <m:r>
                                 <a:rPr lang="en-GB" b="0" i="1" smtClean="0">
-                                  <a:latin typeface="+mj-lt"/>
+                                  <a:latin typeface="Cambria Math"/>
                                 </a:rPr>
                                 <m:t>𝑡𝑖𝑚𝑒</m:t>
                               </m:r>
@@ -22734,25 +23314,25 @@
                       </m:sSub>
                       <m:r>
                         <a:rPr lang="en-GB" i="1">
-                          <a:latin typeface="+mj-lt"/>
+                          <a:latin typeface="Cambria Math"/>
                         </a:rPr>
                         <m:t> </m:t>
                       </m:r>
                       <m:r>
                         <a:rPr lang="en-GB" b="0" i="1" smtClean="0">
-                          <a:latin typeface="+mj-lt"/>
+                          <a:latin typeface="Cambria Math"/>
                         </a:rPr>
                         <m:t>{</m:t>
                       </m:r>
                       <m:r>
                         <a:rPr lang="en-GB" i="1">
-                          <a:latin typeface="+mj-lt"/>
+                          <a:latin typeface="Cambria Math"/>
                         </a:rPr>
                         <m:t> </m:t>
                       </m:r>
                       <m:r>
                         <a:rPr lang="en-GB" i="1">
-                          <a:latin typeface="+mj-lt"/>
+                          <a:latin typeface="Cambria Math"/>
                         </a:rPr>
                         <m:t>𝑠𝑡𝑒𝑝</m:t>
                       </m:r>
@@ -22760,20 +23340,20 @@
                         <m:dPr>
                           <m:ctrlPr>
                             <a:rPr lang="en-US" i="1">
-                              <a:latin typeface="+mj-lt"/>
+                              <a:latin typeface="Cambria Math"/>
                             </a:rPr>
                           </m:ctrlPr>
                         </m:dPr>
                         <m:e>
                           <m:r>
                             <a:rPr lang="en-GB" b="0" i="1" smtClean="0">
-                              <a:latin typeface="+mj-lt"/>
+                              <a:latin typeface="Cambria Math"/>
                             </a:rPr>
                             <m:t>𝑐𝑚𝑑</m:t>
                           </m:r>
                           <m:r>
                             <a:rPr lang="en-GB" b="0" i="1" smtClean="0">
-                              <a:latin typeface="+mj-lt"/>
+                              <a:latin typeface="Cambria Math"/>
                             </a:rPr>
                             <m:t>, 2</m:t>
                           </m:r>
@@ -22781,25 +23361,25 @@
                       </m:d>
                       <m:r>
                         <a:rPr lang="en-GB" i="1">
-                          <a:latin typeface="+mj-lt"/>
+                          <a:latin typeface="Cambria Math"/>
                         </a:rPr>
                         <m:t> </m:t>
                       </m:r>
                       <m:r>
                         <a:rPr lang="en-GB" i="1">
-                          <a:latin typeface="+mj-lt"/>
+                          <a:latin typeface="Cambria Math"/>
                         </a:rPr>
                         <m:t>𝐴𝑁𝐷</m:t>
                       </m:r>
                       <m:r>
                         <a:rPr lang="en-GB" i="1">
-                          <a:latin typeface="+mj-lt"/>
+                          <a:latin typeface="Cambria Math"/>
                         </a:rPr>
                         <m:t> </m:t>
                       </m:r>
                       <m:r>
                         <a:rPr lang="en-GB" b="0" i="1" smtClean="0">
-                          <a:latin typeface="+mj-lt"/>
+                          <a:latin typeface="Cambria Math"/>
                         </a:rPr>
                         <m:t>𝐸𝑣𝑒𝑛𝑡𝑢𝑎𝑙𝑙𝑦</m:t>
                       </m:r>
@@ -22807,44 +23387,44 @@
                         <m:dPr>
                           <m:ctrlPr>
                             <a:rPr lang="en-US" i="1" smtClean="0">
-                              <a:latin typeface="+mj-lt"/>
+                              <a:latin typeface="Cambria Math"/>
                             </a:rPr>
                           </m:ctrlPr>
                         </m:dPr>
                         <m:e>
                           <m:r>
                             <a:rPr lang="en-GB" b="0" i="1" smtClean="0">
-                              <a:latin typeface="+mj-lt"/>
+                              <a:latin typeface="Cambria Math"/>
                             </a:rPr>
                             <m:t>𝑔𝑟𝑒𝑎𝑡𝑒𝑟</m:t>
                           </m:r>
                           <m:r>
                             <a:rPr lang="en-GB" b="0" i="1" smtClean="0">
-                              <a:latin typeface="+mj-lt"/>
+                              <a:latin typeface="Cambria Math"/>
                             </a:rPr>
                             <m:t>(</m:t>
                           </m:r>
                           <m:r>
                             <a:rPr lang="en-GB" b="0" i="1" smtClean="0">
-                              <a:latin typeface="+mj-lt"/>
+                              <a:latin typeface="Cambria Math"/>
                             </a:rPr>
                             <m:t>𝑚𝑠𝑝𝑒𝑒𝑑</m:t>
                           </m:r>
                           <m:r>
                             <a:rPr lang="en-GB" b="0" i="1" smtClean="0">
-                              <a:latin typeface="+mj-lt"/>
+                              <a:latin typeface="Cambria Math"/>
                             </a:rPr>
                             <m:t>−</m:t>
                           </m:r>
                           <m:r>
                             <a:rPr lang="en-GB" b="0" i="1" smtClean="0">
-                              <a:latin typeface="+mj-lt"/>
+                              <a:latin typeface="Cambria Math"/>
                             </a:rPr>
                             <m:t>𝑐𝑚𝑑</m:t>
                           </m:r>
                           <m:r>
                             <a:rPr lang="en-GB" b="0" i="1" smtClean="0">
-                              <a:latin typeface="+mj-lt"/>
+                              <a:latin typeface="Cambria Math"/>
                             </a:rPr>
                             <m:t>,1)</m:t>
                           </m:r>
@@ -22852,7 +23432,7 @@
                       </m:d>
                       <m:r>
                         <a:rPr lang="en-GB" b="0" i="0" smtClean="0">
-                          <a:latin typeface="+mj-lt"/>
+                          <a:latin typeface="Cambria Math"/>
                         </a:rPr>
                         <m:t>}</m:t>
                       </m:r>
@@ -22866,7 +23446,7 @@
             </p:txBody>
           </p:sp>
         </mc:Choice>
-        <mc:Fallback>
+        <mc:Fallback xmlns="">
           <p:sp>
             <p:nvSpPr>
               <p:cNvPr id="9" name="Rectangle 8"/>
@@ -28048,7 +28628,7 @@
           <a:p>
             <a:r>
               <a:rPr lang="en-US" dirty="0" smtClean="0"/>
-              <a:t>Outline</a:t>
+              <a:t>contents</a:t>
             </a:r>
             <a:endParaRPr lang="en-US" dirty="0"/>
           </a:p>
@@ -28100,240 +28680,100 @@
             </a:pPr>
             <a:r>
               <a:rPr lang="en-GB" sz="1800" dirty="0" smtClean="0">
-                <a:solidFill>
-                  <a:schemeClr val="bg1">
-                    <a:lumMod val="75000"/>
-                  </a:schemeClr>
-                </a:solidFill>
                 <a:latin typeface="Arial" panose="020B0604020202020204" pitchFamily="34" charset="0"/>
                 <a:ea typeface="Lato" panose="020F0502020204030203" pitchFamily="34" charset="0"/>
                 <a:cs typeface="Arial" panose="020B0604020202020204" pitchFamily="34" charset="0"/>
               </a:rPr>
               <a:t>Requirements Fundamentals</a:t>
             </a:r>
-            <a:endParaRPr lang="en-GB" sz="1800" dirty="0" smtClean="0">
+          </a:p>
+          <a:p>
+            <a:pPr marL="457200" indent="-457200">
+              <a:buFont typeface="+mj-lt"/>
+              <a:buAutoNum type="arabicPeriod"/>
+            </a:pPr>
+            <a:r>
+              <a:rPr lang="en-GB" sz="1800" dirty="0" smtClean="0">
+                <a:latin typeface="Arial" panose="020B0604020202020204" pitchFamily="34" charset="0"/>
+                <a:ea typeface="Lato" panose="020F0502020204030203" pitchFamily="34" charset="0"/>
+                <a:cs typeface="Arial" panose="020B0604020202020204" pitchFamily="34" charset="0"/>
+              </a:rPr>
+              <a:t>Formal Languages</a:t>
+            </a:r>
+          </a:p>
+          <a:p>
+            <a:pPr marL="457200" indent="-457200">
+              <a:buFont typeface="+mj-lt"/>
+              <a:buAutoNum type="arabicPeriod"/>
+            </a:pPr>
+            <a:r>
+              <a:rPr lang="en-GB" sz="1800" dirty="0" smtClean="0">
+                <a:latin typeface="Arial" panose="020B0604020202020204" pitchFamily="34" charset="0"/>
+                <a:ea typeface="Lato" panose="020F0502020204030203" pitchFamily="34" charset="0"/>
+                <a:cs typeface="Arial" panose="020B0604020202020204" pitchFamily="34" charset="0"/>
+              </a:rPr>
+              <a:t>The Framework</a:t>
+            </a:r>
+          </a:p>
+          <a:p>
+            <a:pPr marL="914400" lvl="1" indent="-457200">
+              <a:buFont typeface="+mj-lt"/>
+              <a:buAutoNum type="arabicPeriod"/>
+            </a:pPr>
+            <a:r>
+              <a:rPr lang="en-GB" sz="1800" dirty="0" smtClean="0">
+                <a:latin typeface="Arial" panose="020B0604020202020204" pitchFamily="34" charset="0"/>
+                <a:ea typeface="Lato" panose="020F0502020204030203" pitchFamily="34" charset="0"/>
+                <a:cs typeface="Arial" panose="020B0604020202020204" pitchFamily="34" charset="0"/>
+              </a:rPr>
+              <a:t>Modelling Libraries</a:t>
+            </a:r>
+            <a:endParaRPr lang="en-GB" sz="1800" dirty="0">
               <a:latin typeface="Arial" panose="020B0604020202020204" pitchFamily="34" charset="0"/>
               <a:ea typeface="Lato" panose="020F0502020204030203" pitchFamily="34" charset="0"/>
               <a:cs typeface="Arial" panose="020B0604020202020204" pitchFamily="34" charset="0"/>
             </a:endParaRPr>
           </a:p>
           <a:p>
+            <a:pPr marL="914400" lvl="1" indent="-457200">
+              <a:buFont typeface="+mj-lt"/>
+              <a:buAutoNum type="arabicPeriod"/>
+            </a:pPr>
+            <a:r>
+              <a:rPr lang="en-GB" sz="1800" dirty="0" smtClean="0">
+                <a:latin typeface="Arial" panose="020B0604020202020204" pitchFamily="34" charset="0"/>
+                <a:ea typeface="Lato" panose="020F0502020204030203" pitchFamily="34" charset="0"/>
+                <a:cs typeface="Arial" panose="020B0604020202020204" pitchFamily="34" charset="0"/>
+              </a:rPr>
+              <a:t>Requirement Editor</a:t>
+            </a:r>
+          </a:p>
+          <a:p>
+            <a:pPr marL="914400" lvl="1" indent="-457200">
+              <a:buFont typeface="+mj-lt"/>
+              <a:buAutoNum type="arabicPeriod"/>
+            </a:pPr>
+            <a:r>
+              <a:rPr lang="en-GB" sz="1800" dirty="0" smtClean="0">
+                <a:latin typeface="Arial" panose="020B0604020202020204" pitchFamily="34" charset="0"/>
+                <a:ea typeface="Lato" panose="020F0502020204030203" pitchFamily="34" charset="0"/>
+                <a:cs typeface="Arial" panose="020B0604020202020204" pitchFamily="34" charset="0"/>
+              </a:rPr>
+              <a:t>Frequency Response</a:t>
+            </a:r>
+            <a:endParaRPr lang="en-GB" sz="1800" dirty="0">
+              <a:latin typeface="Arial" panose="020B0604020202020204" pitchFamily="34" charset="0"/>
+              <a:ea typeface="Lato" panose="020F0502020204030203" pitchFamily="34" charset="0"/>
+              <a:cs typeface="Arial" panose="020B0604020202020204" pitchFamily="34" charset="0"/>
+            </a:endParaRPr>
+          </a:p>
+          <a:p>
             <a:pPr marL="457200" indent="-457200">
               <a:buFont typeface="+mj-lt"/>
               <a:buAutoNum type="arabicPeriod"/>
             </a:pPr>
             <a:r>
               <a:rPr lang="en-GB" sz="1800" dirty="0" smtClean="0">
-                <a:solidFill>
-                  <a:schemeClr val="bg1">
-                    <a:lumMod val="75000"/>
-                  </a:schemeClr>
-                </a:solidFill>
-                <a:latin typeface="Arial" panose="020B0604020202020204" pitchFamily="34" charset="0"/>
-                <a:ea typeface="Lato" panose="020F0502020204030203" pitchFamily="34" charset="0"/>
-                <a:cs typeface="Arial" panose="020B0604020202020204" pitchFamily="34" charset="0"/>
-              </a:rPr>
-              <a:t>Formal </a:t>
-            </a:r>
-            <a:r>
-              <a:rPr lang="en-GB" sz="1800" dirty="0" smtClean="0">
-                <a:solidFill>
-                  <a:schemeClr val="bg1">
-                    <a:lumMod val="75000"/>
-                  </a:schemeClr>
-                </a:solidFill>
-                <a:latin typeface="Arial" panose="020B0604020202020204" pitchFamily="34" charset="0"/>
-                <a:ea typeface="Lato" panose="020F0502020204030203" pitchFamily="34" charset="0"/>
-                <a:cs typeface="Arial" panose="020B0604020202020204" pitchFamily="34" charset="0"/>
-              </a:rPr>
-              <a:t>Languages</a:t>
-            </a:r>
-            <a:endParaRPr lang="en-GB" sz="1800" dirty="0" smtClean="0">
-              <a:latin typeface="Arial" panose="020B0604020202020204" pitchFamily="34" charset="0"/>
-              <a:ea typeface="Lato" panose="020F0502020204030203" pitchFamily="34" charset="0"/>
-              <a:cs typeface="Arial" panose="020B0604020202020204" pitchFamily="34" charset="0"/>
-            </a:endParaRPr>
-          </a:p>
-          <a:p>
-            <a:pPr marL="457200" indent="-457200">
-              <a:buFont typeface="+mj-lt"/>
-              <a:buAutoNum type="arabicPeriod"/>
-            </a:pPr>
-            <a:r>
-              <a:rPr lang="en-GB" sz="1800" dirty="0" smtClean="0">
-                <a:solidFill>
-                  <a:schemeClr val="bg1">
-                    <a:lumMod val="75000"/>
-                  </a:schemeClr>
-                </a:solidFill>
-                <a:latin typeface="Arial" panose="020B0604020202020204" pitchFamily="34" charset="0"/>
-                <a:ea typeface="Lato" panose="020F0502020204030203" pitchFamily="34" charset="0"/>
-                <a:cs typeface="Arial" panose="020B0604020202020204" pitchFamily="34" charset="0"/>
-              </a:rPr>
-              <a:t>The </a:t>
-            </a:r>
-            <a:r>
-              <a:rPr lang="en-GB" sz="1800" dirty="0" smtClean="0">
-                <a:solidFill>
-                  <a:schemeClr val="bg1">
-                    <a:lumMod val="75000"/>
-                  </a:schemeClr>
-                </a:solidFill>
-                <a:latin typeface="Arial" panose="020B0604020202020204" pitchFamily="34" charset="0"/>
-                <a:ea typeface="Lato" panose="020F0502020204030203" pitchFamily="34" charset="0"/>
-                <a:cs typeface="Arial" panose="020B0604020202020204" pitchFamily="34" charset="0"/>
-              </a:rPr>
-              <a:t>Framework</a:t>
-            </a:r>
-            <a:endParaRPr lang="en-GB" sz="1800" dirty="0" smtClean="0">
-              <a:solidFill>
-                <a:schemeClr val="bg1">
-                  <a:lumMod val="75000"/>
-                </a:schemeClr>
-              </a:solidFill>
-              <a:latin typeface="Arial" panose="020B0604020202020204" pitchFamily="34" charset="0"/>
-              <a:ea typeface="Lato" panose="020F0502020204030203" pitchFamily="34" charset="0"/>
-              <a:cs typeface="Arial" panose="020B0604020202020204" pitchFamily="34" charset="0"/>
-            </a:endParaRPr>
-          </a:p>
-          <a:p>
-            <a:pPr marL="914400" lvl="1" indent="-457200">
-              <a:buFont typeface="+mj-lt"/>
-              <a:buAutoNum type="arabicPeriod"/>
-            </a:pPr>
-            <a:r>
-              <a:rPr lang="en-GB" sz="1800" dirty="0" smtClean="0">
-                <a:solidFill>
-                  <a:schemeClr val="bg1">
-                    <a:lumMod val="75000"/>
-                  </a:schemeClr>
-                </a:solidFill>
-                <a:latin typeface="Arial" panose="020B0604020202020204" pitchFamily="34" charset="0"/>
-                <a:ea typeface="Lato" panose="020F0502020204030203" pitchFamily="34" charset="0"/>
-                <a:cs typeface="Arial" panose="020B0604020202020204" pitchFamily="34" charset="0"/>
-              </a:rPr>
-              <a:t>Modelling </a:t>
-            </a:r>
-            <a:r>
-              <a:rPr lang="en-GB" sz="1800" dirty="0" smtClean="0">
-                <a:solidFill>
-                  <a:schemeClr val="bg1">
-                    <a:lumMod val="75000"/>
-                  </a:schemeClr>
-                </a:solidFill>
-                <a:latin typeface="Arial" panose="020B0604020202020204" pitchFamily="34" charset="0"/>
-                <a:ea typeface="Lato" panose="020F0502020204030203" pitchFamily="34" charset="0"/>
-                <a:cs typeface="Arial" panose="020B0604020202020204" pitchFamily="34" charset="0"/>
-              </a:rPr>
-              <a:t>Libraries</a:t>
-            </a:r>
-            <a:endParaRPr lang="en-GB" sz="1800" dirty="0">
-              <a:solidFill>
-                <a:schemeClr val="bg1">
-                  <a:lumMod val="75000"/>
-                </a:schemeClr>
-              </a:solidFill>
-              <a:latin typeface="Arial" panose="020B0604020202020204" pitchFamily="34" charset="0"/>
-              <a:ea typeface="Lato" panose="020F0502020204030203" pitchFamily="34" charset="0"/>
-              <a:cs typeface="Arial" panose="020B0604020202020204" pitchFamily="34" charset="0"/>
-            </a:endParaRPr>
-          </a:p>
-          <a:p>
-            <a:pPr marL="914400" lvl="1" indent="-457200">
-              <a:buFont typeface="+mj-lt"/>
-              <a:buAutoNum type="arabicPeriod"/>
-            </a:pPr>
-            <a:r>
-              <a:rPr lang="en-GB" sz="1800" dirty="0" smtClean="0">
-                <a:solidFill>
-                  <a:schemeClr val="bg1">
-                    <a:lumMod val="75000"/>
-                  </a:schemeClr>
-                </a:solidFill>
-                <a:latin typeface="Arial" panose="020B0604020202020204" pitchFamily="34" charset="0"/>
-                <a:ea typeface="Lato" panose="020F0502020204030203" pitchFamily="34" charset="0"/>
-                <a:cs typeface="Arial" panose="020B0604020202020204" pitchFamily="34" charset="0"/>
-              </a:rPr>
-              <a:t>Requirement </a:t>
-            </a:r>
-            <a:r>
-              <a:rPr lang="en-GB" sz="1800" dirty="0" smtClean="0">
-                <a:solidFill>
-                  <a:schemeClr val="bg1">
-                    <a:lumMod val="75000"/>
-                  </a:schemeClr>
-                </a:solidFill>
-                <a:latin typeface="Arial" panose="020B0604020202020204" pitchFamily="34" charset="0"/>
-                <a:ea typeface="Lato" panose="020F0502020204030203" pitchFamily="34" charset="0"/>
-                <a:cs typeface="Arial" panose="020B0604020202020204" pitchFamily="34" charset="0"/>
-              </a:rPr>
-              <a:t>Editor</a:t>
-            </a:r>
-            <a:endParaRPr lang="en-GB" sz="1800" dirty="0" smtClean="0">
-              <a:solidFill>
-                <a:schemeClr val="bg1">
-                  <a:lumMod val="75000"/>
-                </a:schemeClr>
-              </a:solidFill>
-              <a:latin typeface="Arial" panose="020B0604020202020204" pitchFamily="34" charset="0"/>
-              <a:ea typeface="Lato" panose="020F0502020204030203" pitchFamily="34" charset="0"/>
-              <a:cs typeface="Arial" panose="020B0604020202020204" pitchFamily="34" charset="0"/>
-            </a:endParaRPr>
-          </a:p>
-          <a:p>
-            <a:pPr marL="914400" lvl="1" indent="-457200">
-              <a:buFont typeface="+mj-lt"/>
-              <a:buAutoNum type="arabicPeriod"/>
-            </a:pPr>
-            <a:r>
-              <a:rPr lang="en-GB" sz="1800" dirty="0" smtClean="0">
-                <a:solidFill>
-                  <a:schemeClr val="bg1">
-                    <a:lumMod val="75000"/>
-                  </a:schemeClr>
-                </a:solidFill>
-                <a:latin typeface="Arial" panose="020B0604020202020204" pitchFamily="34" charset="0"/>
-                <a:ea typeface="Lato" panose="020F0502020204030203" pitchFamily="34" charset="0"/>
-                <a:cs typeface="Arial" panose="020B0604020202020204" pitchFamily="34" charset="0"/>
-              </a:rPr>
-              <a:t>Frequency </a:t>
-            </a:r>
-            <a:r>
-              <a:rPr lang="en-GB" sz="1800" dirty="0" smtClean="0">
-                <a:solidFill>
-                  <a:schemeClr val="bg1">
-                    <a:lumMod val="75000"/>
-                  </a:schemeClr>
-                </a:solidFill>
-                <a:latin typeface="Arial" panose="020B0604020202020204" pitchFamily="34" charset="0"/>
-                <a:ea typeface="Lato" panose="020F0502020204030203" pitchFamily="34" charset="0"/>
-                <a:cs typeface="Arial" panose="020B0604020202020204" pitchFamily="34" charset="0"/>
-              </a:rPr>
-              <a:t>Response</a:t>
-            </a:r>
-            <a:endParaRPr lang="en-GB" sz="1800" dirty="0">
-              <a:solidFill>
-                <a:schemeClr val="bg1">
-                  <a:lumMod val="75000"/>
-                </a:schemeClr>
-              </a:solidFill>
-              <a:latin typeface="Arial" panose="020B0604020202020204" pitchFamily="34" charset="0"/>
-              <a:ea typeface="Lato" panose="020F0502020204030203" pitchFamily="34" charset="0"/>
-              <a:cs typeface="Arial" panose="020B0604020202020204" pitchFamily="34" charset="0"/>
-            </a:endParaRPr>
-          </a:p>
-          <a:p>
-            <a:pPr marL="457200" indent="-457200">
-              <a:buFont typeface="+mj-lt"/>
-              <a:buAutoNum type="arabicPeriod"/>
-            </a:pPr>
-            <a:r>
-              <a:rPr lang="en-GB" sz="1800" dirty="0" smtClean="0">
-                <a:solidFill>
-                  <a:schemeClr val="bg1">
-                    <a:lumMod val="75000"/>
-                  </a:schemeClr>
-                </a:solidFill>
                 <a:latin typeface="Arial" panose="020B0604020202020204" pitchFamily="34" charset="0"/>
                 <a:ea typeface="Lato" panose="020F0502020204030203" pitchFamily="34" charset="0"/>
                 <a:cs typeface="Arial" panose="020B0604020202020204" pitchFamily="34" charset="0"/>
@@ -28341,11 +28781,6 @@
               <a:t>Conclusion</a:t>
             </a:r>
             <a:endParaRPr lang="en-GB" sz="2000" dirty="0" smtClean="0">
-              <a:solidFill>
-                <a:schemeClr val="bg1">
-                  <a:lumMod val="75000"/>
-                </a:schemeClr>
-              </a:solidFill>
               <a:latin typeface="Arial" panose="020B0604020202020204" pitchFamily="34" charset="0"/>
               <a:ea typeface="Lato" panose="020F0502020204030203" pitchFamily="34" charset="0"/>
               <a:cs typeface="Arial" panose="020B0604020202020204" pitchFamily="34" charset="0"/>
@@ -28872,13 +29307,7 @@
               <a:rPr lang="en-GB" dirty="0" smtClean="0">
                 <a:latin typeface="+mj-lt"/>
               </a:rPr>
-              <a:t>Word-by-Word </a:t>
-            </a:r>
-            <a:r>
-              <a:rPr lang="en-GB" dirty="0" smtClean="0">
-                <a:latin typeface="+mj-lt"/>
-              </a:rPr>
-              <a:t>Completion</a:t>
+              <a:t>Word-by-Word Completion</a:t>
             </a:r>
             <a:endParaRPr lang="en-GB" dirty="0">
               <a:latin typeface="+mj-lt"/>
@@ -33815,11 +34244,6 @@
               </a:rPr>
               <a:t>System-Level</a:t>
             </a:r>
-            <a:endParaRPr lang="en-GB" sz="1600" dirty="0" smtClean="0">
-              <a:solidFill>
-                <a:schemeClr val="tx1"/>
-              </a:solidFill>
-            </a:endParaRPr>
           </a:p>
           <a:p>
             <a:pPr algn="ctr"/>
@@ -33978,7 +34402,7 @@
         </p:nvSpPr>
         <p:spPr>
           <a:xfrm>
-            <a:off x="7406548" y="1912014"/>
+            <a:off x="7406548" y="1828800"/>
             <a:ext cx="1442288" cy="495366"/>
           </a:xfrm>
           <a:prstGeom prst="rect">
@@ -34477,7 +34901,7 @@
         </p:nvGrpSpPr>
         <p:grpSpPr>
           <a:xfrm rot="781151">
-            <a:off x="1617258" y="1412268"/>
+            <a:off x="1681626" y="1412268"/>
             <a:ext cx="1196053" cy="1046509"/>
             <a:chOff x="1455751" y="1363693"/>
             <a:chExt cx="1196053" cy="1046509"/>
@@ -34584,7 +35008,7 @@
         </p:nvSpPr>
         <p:spPr>
           <a:xfrm>
-            <a:off x="1662226" y="1603819"/>
+            <a:off x="1726594" y="1603819"/>
             <a:ext cx="1397606" cy="891368"/>
           </a:xfrm>
           <a:prstGeom prst="rect">
@@ -35137,7 +35561,7 @@
           <p:nvPr/>
         </p:nvPicPr>
         <p:blipFill>
-          <a:blip r:embed="rId2">
+          <a:blip r:embed="rId3">
             <a:extLst>
               <a:ext uri="{28A0092B-C50C-407E-A947-70E740481C1C}">
                 <a14:useLocalDpi xmlns:a14="http://schemas.microsoft.com/office/drawing/2010/main" val="0"/>
@@ -35299,7 +35723,7 @@
           <p:nvPr/>
         </p:nvPicPr>
         <p:blipFill>
-          <a:blip r:embed="rId3">
+          <a:blip r:embed="rId4">
             <a:extLst>
               <a:ext uri="{28A0092B-C50C-407E-A947-70E740481C1C}">
                 <a14:useLocalDpi xmlns:a14="http://schemas.microsoft.com/office/drawing/2010/main" val="0"/>
@@ -38161,7 +38585,21 @@
                 <a:ea typeface="Lato" panose="020F0502020204030203" pitchFamily="34" charset="0"/>
                 <a:cs typeface="Lato" panose="020F0502020204030203" pitchFamily="34" charset="0"/>
               </a:rPr>
-              <a:t>Requirements can be validated during simulation (or after) by means of </a:t>
+              <a:t>Requirements can be </a:t>
+            </a:r>
+            <a:r>
+              <a:rPr lang="en-GB" sz="1600" dirty="0" smtClean="0">
+                <a:ea typeface="Lato" panose="020F0502020204030203" pitchFamily="34" charset="0"/>
+                <a:cs typeface="Lato" panose="020F0502020204030203" pitchFamily="34" charset="0"/>
+              </a:rPr>
+              <a:t>verified during </a:t>
+            </a:r>
+            <a:r>
+              <a:rPr lang="en-GB" sz="1600" dirty="0">
+                <a:ea typeface="Lato" panose="020F0502020204030203" pitchFamily="34" charset="0"/>
+                <a:cs typeface="Lato" panose="020F0502020204030203" pitchFamily="34" charset="0"/>
+              </a:rPr>
+              <a:t>simulation (or after) by means of </a:t>
             </a:r>
             <a:r>
               <a:rPr lang="en-GB" sz="1600" i="1" dirty="0">

</xml_diff>